<commit_message>
Slideshow & Status Report
Updated slides and created status report
</commit_message>
<xml_diff>
--- a/FINAL DELIVERABLES/Veni System Report Apr 22.pptx
+++ b/FINAL DELIVERABLES/Veni System Report Apr 22.pptx
@@ -11,14 +11,13 @@
     <p:sldId id="273" r:id="rId5"/>
     <p:sldId id="279" r:id="rId6"/>
     <p:sldId id="271" r:id="rId7"/>
-    <p:sldId id="267" r:id="rId8"/>
-    <p:sldId id="274" r:id="rId9"/>
-    <p:sldId id="275" r:id="rId10"/>
-    <p:sldId id="276" r:id="rId11"/>
-    <p:sldId id="277" r:id="rId12"/>
-    <p:sldId id="270" r:id="rId13"/>
-    <p:sldId id="266" r:id="rId14"/>
-    <p:sldId id="278" r:id="rId15"/>
+    <p:sldId id="270" r:id="rId8"/>
+    <p:sldId id="267" r:id="rId9"/>
+    <p:sldId id="274" r:id="rId10"/>
+    <p:sldId id="275" r:id="rId11"/>
+    <p:sldId id="276" r:id="rId12"/>
+    <p:sldId id="277" r:id="rId13"/>
+    <p:sldId id="278" r:id="rId14"/>
   </p:sldIdLst>
   <p:sldSz cx="12192000" cy="6858000"/>
   <p:notesSz cx="6858000" cy="9144000"/>
@@ -399,7 +398,7 @@
           <a:p>
             <a:fld id="{AF239A9A-B4B0-4B32-B8CD-2E25E95134C4}" type="datetimeFigureOut">
               <a:rPr lang="en-US" smtClean="0"/>
-              <a:t>4/19/2015</a:t>
+              <a:t>4/21/2015</a:t>
             </a:fld>
             <a:endParaRPr lang="en-US" dirty="0"/>
           </a:p>
@@ -823,7 +822,7 @@
           <a:p>
             <a:fld id="{F25518A9-B687-4302-9395-2322403C6656}" type="datetimeFigureOut">
               <a:rPr lang="en-US" smtClean="0"/>
-              <a:t>4/19/2015</a:t>
+              <a:t>4/21/2015</a:t>
             </a:fld>
             <a:endParaRPr lang="en-US" dirty="0"/>
           </a:p>
@@ -1169,7 +1168,7 @@
           <a:p>
             <a:fld id="{1A99A684-0CB7-41E9-A4DF-5D1C2CA5BF6F}" type="datetimeFigureOut">
               <a:rPr lang="en-US" smtClean="0"/>
-              <a:t>4/19/2015</a:t>
+              <a:t>4/21/2015</a:t>
             </a:fld>
             <a:endParaRPr lang="en-US" dirty="0"/>
           </a:p>
@@ -1584,7 +1583,7 @@
           <a:p>
             <a:fld id="{FEDD7C35-9E19-4518-A4B2-3B09CD8CC756}" type="datetimeFigureOut">
               <a:rPr lang="en-US" smtClean="0"/>
-              <a:t>4/19/2015</a:t>
+              <a:t>4/21/2015</a:t>
             </a:fld>
             <a:endParaRPr lang="en-US" dirty="0"/>
           </a:p>
@@ -2162,7 +2161,7 @@
           <a:p>
             <a:fld id="{26196DA8-8897-4DDF-BFB6-5D83863C837A}" type="datetimeFigureOut">
               <a:rPr lang="en-US" smtClean="0"/>
-              <a:t>4/19/2015</a:t>
+              <a:t>4/21/2015</a:t>
             </a:fld>
             <a:endParaRPr lang="en-US" dirty="0"/>
           </a:p>
@@ -2853,7 +2852,7 @@
           <a:p>
             <a:fld id="{DCBBA708-C5F0-412D-90E2-1919F0D196AE}" type="datetimeFigureOut">
               <a:rPr lang="en-US" smtClean="0"/>
-              <a:t>4/19/2015</a:t>
+              <a:t>4/21/2015</a:t>
             </a:fld>
             <a:endParaRPr lang="en-US" dirty="0"/>
           </a:p>
@@ -3776,7 +3775,7 @@
           <a:p>
             <a:fld id="{A9C8F8FA-EF43-4642-9368-3F4E33039BD9}" type="datetimeFigureOut">
               <a:rPr lang="en-US" smtClean="0"/>
-              <a:t>4/19/2015</a:t>
+              <a:t>4/21/2015</a:t>
             </a:fld>
             <a:endParaRPr lang="en-US" dirty="0"/>
           </a:p>
@@ -4099,7 +4098,7 @@
           <a:p>
             <a:fld id="{6B61E721-B01C-4D5D-A3CA-2E5518383F10}" type="datetimeFigureOut">
               <a:rPr lang="en-US" smtClean="0"/>
-              <a:t>4/19/2015</a:t>
+              <a:t>4/21/2015</a:t>
             </a:fld>
             <a:endParaRPr lang="en-US" dirty="0"/>
           </a:p>
@@ -4373,7 +4372,7 @@
           <a:p>
             <a:fld id="{6513FEF9-69D0-4F8C-A336-59491FBEDC47}" type="datetimeFigureOut">
               <a:rPr lang="en-US" smtClean="0"/>
-              <a:t>4/19/2015</a:t>
+              <a:t>4/21/2015</a:t>
             </a:fld>
             <a:endParaRPr lang="en-US" dirty="0"/>
           </a:p>
@@ -4707,7 +4706,7 @@
           <a:p>
             <a:fld id="{A91E21DC-8981-44E6-BC8C-2BA8F673FFBB}" type="datetimeFigureOut">
               <a:rPr lang="en-US" smtClean="0"/>
-              <a:t>4/19/2015</a:t>
+              <a:t>4/21/2015</a:t>
             </a:fld>
             <a:endParaRPr lang="en-US" dirty="0"/>
           </a:p>
@@ -5130,7 +5129,7 @@
           <a:p>
             <a:fld id="{AEB9C5D3-0140-4E75-8D7F-C0623D06DFD7}" type="datetimeFigureOut">
               <a:rPr lang="en-US" smtClean="0"/>
-              <a:t>4/19/2015</a:t>
+              <a:t>4/21/2015</a:t>
             </a:fld>
             <a:endParaRPr lang="en-US" dirty="0"/>
           </a:p>
@@ -5516,7 +5515,7 @@
           <a:p>
             <a:fld id="{3A5666F9-5B40-48E0-8DFD-99EF944CDD22}" type="datetimeFigureOut">
               <a:rPr lang="en-US" smtClean="0"/>
-              <a:t>4/19/2015</a:t>
+              <a:t>4/21/2015</a:t>
             </a:fld>
             <a:endParaRPr lang="en-US" dirty="0"/>
           </a:p>
@@ -6032,7 +6031,7 @@
           <a:p>
             <a:fld id="{2A698D6B-2C72-4E21-9893-A649C6E2A47D}" type="datetimeFigureOut">
               <a:rPr lang="en-US" smtClean="0"/>
-              <a:t>4/19/2015</a:t>
+              <a:t>4/21/2015</a:t>
             </a:fld>
             <a:endParaRPr lang="en-US" dirty="0"/>
           </a:p>
@@ -6299,7 +6298,7 @@
           <a:p>
             <a:fld id="{C86811C9-A66C-49F0-970E-F7B68D9109A0}" type="datetimeFigureOut">
               <a:rPr lang="en-US" smtClean="0"/>
-              <a:t>4/19/2015</a:t>
+              <a:t>4/21/2015</a:t>
             </a:fld>
             <a:endParaRPr lang="en-US" dirty="0"/>
           </a:p>
@@ -6472,7 +6471,7 @@
           <a:p>
             <a:fld id="{6C01AE78-96A2-4A23-B183-3B6DB4374FE7}" type="datetimeFigureOut">
               <a:rPr lang="en-US" smtClean="0"/>
-              <a:t>4/19/2015</a:t>
+              <a:t>4/21/2015</a:t>
             </a:fld>
             <a:endParaRPr lang="en-US" dirty="0"/>
           </a:p>
@@ -6872,7 +6871,7 @@
           <a:p>
             <a:fld id="{73AE0757-B101-4811-9189-10EB2F458E2D}" type="datetimeFigureOut">
               <a:rPr lang="en-US" smtClean="0"/>
-              <a:t>4/19/2015</a:t>
+              <a:t>4/21/2015</a:t>
             </a:fld>
             <a:endParaRPr lang="en-US" dirty="0"/>
           </a:p>
@@ -7291,7 +7290,7 @@
           <a:p>
             <a:fld id="{7EBDC078-589F-40E3-816C-EE21D62B5BBA}" type="datetimeFigureOut">
               <a:rPr lang="en-US" smtClean="0"/>
-              <a:t>4/19/2015</a:t>
+              <a:t>4/21/2015</a:t>
             </a:fld>
             <a:endParaRPr lang="en-US" dirty="0"/>
           </a:p>
@@ -7545,7 +7544,7 @@
           <a:p>
             <a:fld id="{C7004436-CA73-4D53-89B4-2A5C7347BF2F}" type="datetimeFigureOut">
               <a:rPr lang="en-US" smtClean="0"/>
-              <a:t>4/19/2015</a:t>
+              <a:t>4/21/2015</a:t>
             </a:fld>
             <a:endParaRPr lang="en-US" dirty="0"/>
           </a:p>
@@ -8447,6 +8446,135 @@
           <a:lstStyle/>
           <a:p>
             <a:r>
+              <a:rPr lang="en-US" smtClean="0"/>
+              <a:t>RESTful Nirvana?</a:t>
+            </a:r>
+            <a:endParaRPr lang="en-US"/>
+          </a:p>
+        </p:txBody>
+      </p:sp>
+      <p:sp>
+        <p:nvSpPr>
+          <p:cNvPr id="3" name="Content Placeholder 2"/>
+          <p:cNvSpPr>
+            <a:spLocks noGrp="1"/>
+          </p:cNvSpPr>
+          <p:nvPr>
+            <p:ph idx="1"/>
+          </p:nvPr>
+        </p:nvSpPr>
+        <p:spPr>
+          <a:xfrm>
+            <a:off x="680321" y="2336873"/>
+            <a:ext cx="10086002" cy="3599316"/>
+          </a:xfrm>
+        </p:spPr>
+        <p:txBody>
+          <a:bodyPr/>
+          <a:lstStyle/>
+          <a:p>
+            <a:r>
+              <a:rPr lang="en-US" dirty="0" smtClean="0"/>
+              <a:t>All services use plain-old JSON to represent the state being transferred</a:t>
+            </a:r>
+          </a:p>
+          <a:p>
+            <a:r>
+              <a:rPr lang="en-US" dirty="0" smtClean="0"/>
+              <a:t>Everything is fully stateless</a:t>
+            </a:r>
+          </a:p>
+          <a:p>
+            <a:pPr lvl="1"/>
+            <a:r>
+              <a:rPr lang="en-US" dirty="0" smtClean="0"/>
+              <a:t>Only server-side state is authentication session – described by an opaque token</a:t>
+            </a:r>
+          </a:p>
+          <a:p>
+            <a:r>
+              <a:rPr lang="en-US" dirty="0" smtClean="0"/>
+              <a:t>State described as resources and collections of resources</a:t>
+            </a:r>
+          </a:p>
+          <a:p>
+            <a:pPr lvl="1"/>
+            <a:r>
+              <a:rPr lang="en-US" dirty="0" smtClean="0"/>
+              <a:t>Out of band information in HTTP headers</a:t>
+            </a:r>
+          </a:p>
+          <a:p>
+            <a:pPr lvl="1"/>
+            <a:r>
+              <a:rPr lang="en-US" dirty="0" smtClean="0"/>
+              <a:t>Queries to narrow state selection passed in query-strings</a:t>
+            </a:r>
+          </a:p>
+          <a:p>
+            <a:r>
+              <a:rPr lang="en-US" dirty="0" smtClean="0"/>
+              <a:t>Access by standard HTTP verbs: GET, POST, PUT, DELETE</a:t>
+            </a:r>
+          </a:p>
+          <a:p>
+            <a:r>
+              <a:rPr lang="en-US" dirty="0" smtClean="0"/>
+              <a:t>Use of hypermedia links where appropriate</a:t>
+            </a:r>
+            <a:endParaRPr lang="en-US" dirty="0"/>
+          </a:p>
+        </p:txBody>
+      </p:sp>
+    </p:spTree>
+    <p:extLst>
+      <p:ext uri="{BB962C8B-B14F-4D97-AF65-F5344CB8AC3E}">
+        <p14:creationId xmlns:p14="http://schemas.microsoft.com/office/powerpoint/2010/main" val="1040371199"/>
+      </p:ext>
+    </p:extLst>
+  </p:cSld>
+  <p:clrMapOvr>
+    <a:masterClrMapping/>
+  </p:clrMapOvr>
+  <p:transition spd="slow">
+    <p:wipe dir="r"/>
+  </p:transition>
+</p:sld>
+</file>
+
+<file path=ppt/slides/slide11.xml><?xml version="1.0" encoding="utf-8"?>
+<p:sld xmlns:a="http://schemas.openxmlformats.org/drawingml/2006/main" xmlns:r="http://schemas.openxmlformats.org/officeDocument/2006/relationships" xmlns:p="http://schemas.openxmlformats.org/presentationml/2006/main">
+  <p:cSld>
+    <p:spTree>
+      <p:nvGrpSpPr>
+        <p:cNvPr id="1" name=""/>
+        <p:cNvGrpSpPr/>
+        <p:nvPr/>
+      </p:nvGrpSpPr>
+      <p:grpSpPr>
+        <a:xfrm>
+          <a:off x="0" y="0"/>
+          <a:ext cx="0" cy="0"/>
+          <a:chOff x="0" y="0"/>
+          <a:chExt cx="0" cy="0"/>
+        </a:xfrm>
+      </p:grpSpPr>
+      <p:sp>
+        <p:nvSpPr>
+          <p:cNvPr id="2" name="Title 1"/>
+          <p:cNvSpPr>
+            <a:spLocks noGrp="1"/>
+          </p:cNvSpPr>
+          <p:nvPr>
+            <p:ph type="title"/>
+          </p:nvPr>
+        </p:nvSpPr>
+        <p:spPr/>
+        <p:txBody>
+          <a:bodyPr/>
+          <a:lstStyle/>
+          <a:p>
+            <a:r>
               <a:rPr lang="en-US" dirty="0" smtClean="0"/>
               <a:t>Security Analysis</a:t>
             </a:r>
@@ -8572,7 +8700,7 @@
 </p:sld>
 </file>
 
-<file path=ppt/slides/slide11.xml><?xml version="1.0" encoding="utf-8"?>
+<file path=ppt/slides/slide12.xml><?xml version="1.0" encoding="utf-8"?>
 <p:sld xmlns:a="http://schemas.openxmlformats.org/drawingml/2006/main" xmlns:r="http://schemas.openxmlformats.org/officeDocument/2006/relationships" xmlns:p="http://schemas.openxmlformats.org/presentationml/2006/main">
   <p:cSld>
     <p:spTree>
@@ -8822,2010 +8950,7 @@
 </p:sld>
 </file>
 
-<file path=ppt/slides/slide12.xml><?xml version="1.0" encoding="utf-8"?>
-<p:sld xmlns:a="http://schemas.openxmlformats.org/drawingml/2006/main" xmlns:r="http://schemas.openxmlformats.org/officeDocument/2006/relationships" xmlns:p="http://schemas.openxmlformats.org/presentationml/2006/main">
-  <p:cSld>
-    <p:spTree>
-      <p:nvGrpSpPr>
-        <p:cNvPr id="1" name=""/>
-        <p:cNvGrpSpPr/>
-        <p:nvPr/>
-      </p:nvGrpSpPr>
-      <p:grpSpPr>
-        <a:xfrm>
-          <a:off x="0" y="0"/>
-          <a:ext cx="0" cy="0"/>
-          <a:chOff x="0" y="0"/>
-          <a:chExt cx="0" cy="0"/>
-        </a:xfrm>
-      </p:grpSpPr>
-      <p:cxnSp>
-        <p:nvCxnSpPr>
-          <p:cNvPr id="10" name="Straight Connector 9"/>
-          <p:cNvCxnSpPr/>
-          <p:nvPr/>
-        </p:nvCxnSpPr>
-        <p:spPr>
-          <a:xfrm>
-            <a:off x="2330245" y="3011532"/>
-            <a:ext cx="3629961" cy="262610"/>
-          </a:xfrm>
-          <a:prstGeom prst="line">
-            <a:avLst/>
-          </a:prstGeom>
-          <a:ln>
-            <a:solidFill>
-              <a:schemeClr val="accent4"/>
-            </a:solidFill>
-          </a:ln>
-        </p:spPr>
-        <p:style>
-          <a:lnRef idx="1">
-            <a:schemeClr val="accent1"/>
-          </a:lnRef>
-          <a:fillRef idx="0">
-            <a:schemeClr val="accent1"/>
-          </a:fillRef>
-          <a:effectRef idx="0">
-            <a:schemeClr val="accent1"/>
-          </a:effectRef>
-          <a:fontRef idx="minor">
-            <a:schemeClr val="tx1"/>
-          </a:fontRef>
-        </p:style>
-      </p:cxnSp>
-      <p:cxnSp>
-        <p:nvCxnSpPr>
-          <p:cNvPr id="13" name="Straight Connector 12"/>
-          <p:cNvCxnSpPr/>
-          <p:nvPr/>
-        </p:nvCxnSpPr>
-        <p:spPr>
-          <a:xfrm>
-            <a:off x="6558116" y="3362632"/>
-            <a:ext cx="2831690" cy="1336852"/>
-          </a:xfrm>
-          <a:prstGeom prst="line">
-            <a:avLst/>
-          </a:prstGeom>
-          <a:ln>
-            <a:solidFill>
-              <a:schemeClr val="accent4"/>
-            </a:solidFill>
-          </a:ln>
-        </p:spPr>
-        <p:style>
-          <a:lnRef idx="1">
-            <a:schemeClr val="accent1"/>
-          </a:lnRef>
-          <a:fillRef idx="0">
-            <a:schemeClr val="accent1"/>
-          </a:fillRef>
-          <a:effectRef idx="0">
-            <a:schemeClr val="accent1"/>
-          </a:effectRef>
-          <a:fontRef idx="minor">
-            <a:schemeClr val="tx1"/>
-          </a:fontRef>
-        </p:style>
-      </p:cxnSp>
-      <p:cxnSp>
-        <p:nvCxnSpPr>
-          <p:cNvPr id="16" name="Straight Connector 15"/>
-          <p:cNvCxnSpPr/>
-          <p:nvPr/>
-        </p:nvCxnSpPr>
-        <p:spPr>
-          <a:xfrm flipV="1">
-            <a:off x="6449961" y="3138843"/>
-            <a:ext cx="2782529" cy="189090"/>
-          </a:xfrm>
-          <a:prstGeom prst="line">
-            <a:avLst/>
-          </a:prstGeom>
-          <a:ln>
-            <a:solidFill>
-              <a:schemeClr val="accent4"/>
-            </a:solidFill>
-          </a:ln>
-        </p:spPr>
-        <p:style>
-          <a:lnRef idx="1">
-            <a:schemeClr val="accent1"/>
-          </a:lnRef>
-          <a:fillRef idx="0">
-            <a:schemeClr val="accent1"/>
-          </a:fillRef>
-          <a:effectRef idx="0">
-            <a:schemeClr val="accent1"/>
-          </a:effectRef>
-          <a:fontRef idx="minor">
-            <a:schemeClr val="tx1"/>
-          </a:fontRef>
-        </p:style>
-      </p:cxnSp>
-      <p:cxnSp>
-        <p:nvCxnSpPr>
-          <p:cNvPr id="21" name="Straight Connector 20"/>
-          <p:cNvCxnSpPr/>
-          <p:nvPr/>
-        </p:nvCxnSpPr>
-        <p:spPr>
-          <a:xfrm>
-            <a:off x="2482645" y="3163932"/>
-            <a:ext cx="2229614" cy="1189922"/>
-          </a:xfrm>
-          <a:prstGeom prst="line">
-            <a:avLst/>
-          </a:prstGeom>
-          <a:ln>
-            <a:solidFill>
-              <a:schemeClr val="accent4"/>
-            </a:solidFill>
-          </a:ln>
-        </p:spPr>
-        <p:style>
-          <a:lnRef idx="1">
-            <a:schemeClr val="accent1"/>
-          </a:lnRef>
-          <a:fillRef idx="0">
-            <a:schemeClr val="accent1"/>
-          </a:fillRef>
-          <a:effectRef idx="0">
-            <a:schemeClr val="accent1"/>
-          </a:effectRef>
-          <a:fontRef idx="minor">
-            <a:schemeClr val="tx1"/>
-          </a:fontRef>
-        </p:style>
-      </p:cxnSp>
-      <p:cxnSp>
-        <p:nvCxnSpPr>
-          <p:cNvPr id="23" name="Straight Connector 22"/>
-          <p:cNvCxnSpPr/>
-          <p:nvPr/>
-        </p:nvCxnSpPr>
-        <p:spPr>
-          <a:xfrm flipV="1">
-            <a:off x="7000568" y="4707948"/>
-            <a:ext cx="2231922" cy="553861"/>
-          </a:xfrm>
-          <a:prstGeom prst="line">
-            <a:avLst/>
-          </a:prstGeom>
-          <a:ln>
-            <a:solidFill>
-              <a:schemeClr val="accent4"/>
-            </a:solidFill>
-          </a:ln>
-        </p:spPr>
-        <p:style>
-          <a:lnRef idx="1">
-            <a:schemeClr val="accent1"/>
-          </a:lnRef>
-          <a:fillRef idx="0">
-            <a:schemeClr val="accent1"/>
-          </a:fillRef>
-          <a:effectRef idx="0">
-            <a:schemeClr val="accent1"/>
-          </a:effectRef>
-          <a:fontRef idx="minor">
-            <a:schemeClr val="tx1"/>
-          </a:fontRef>
-        </p:style>
-      </p:cxnSp>
-      <p:sp>
-        <p:nvSpPr>
-          <p:cNvPr id="2" name="Title 1"/>
-          <p:cNvSpPr>
-            <a:spLocks noGrp="1"/>
-          </p:cNvSpPr>
-          <p:nvPr>
-            <p:ph type="title"/>
-          </p:nvPr>
-        </p:nvSpPr>
-        <p:spPr/>
-        <p:txBody>
-          <a:bodyPr/>
-          <a:lstStyle/>
-          <a:p>
-            <a:r>
-              <a:rPr lang="en-US" dirty="0" smtClean="0"/>
-              <a:t>Primary Use Case: Check-in at VA Facility</a:t>
-            </a:r>
-            <a:endParaRPr lang="en-US" dirty="0"/>
-          </a:p>
-        </p:txBody>
-      </p:sp>
-      <p:sp>
-        <p:nvSpPr>
-          <p:cNvPr id="3" name="Rectangle 2"/>
-          <p:cNvSpPr/>
-          <p:nvPr/>
-        </p:nvSpPr>
-        <p:spPr>
-          <a:xfrm>
-            <a:off x="3303639" y="2231923"/>
-            <a:ext cx="4798142" cy="4149212"/>
-          </a:xfrm>
-          <a:prstGeom prst="rect">
-            <a:avLst/>
-          </a:prstGeom>
-          <a:noFill/>
-          <a:ln w="19050">
-            <a:solidFill>
-              <a:srgbClr val="FFC000"/>
-            </a:solidFill>
-          </a:ln>
-        </p:spPr>
-        <p:style>
-          <a:lnRef idx="2">
-            <a:schemeClr val="accent1">
-              <a:shade val="50000"/>
-            </a:schemeClr>
-          </a:lnRef>
-          <a:fillRef idx="1">
-            <a:schemeClr val="accent1"/>
-          </a:fillRef>
-          <a:effectRef idx="0">
-            <a:schemeClr val="accent1"/>
-          </a:effectRef>
-          <a:fontRef idx="minor">
-            <a:schemeClr val="lt1"/>
-          </a:fontRef>
-        </p:style>
-        <p:txBody>
-          <a:bodyPr rtlCol="0" anchor="ctr"/>
-          <a:lstStyle/>
-          <a:p>
-            <a:pPr algn="ctr"/>
-            <a:endParaRPr lang="en-US"/>
-          </a:p>
-        </p:txBody>
-      </p:sp>
-      <p:pic>
-        <p:nvPicPr>
-          <p:cNvPr id="4" name="Picture 3"/>
-          <p:cNvPicPr>
-            <a:picLocks noChangeAspect="1"/>
-          </p:cNvPicPr>
-          <p:nvPr/>
-        </p:nvPicPr>
-        <p:blipFill>
-          <a:blip r:embed="rId2"/>
-          <a:stretch>
-            <a:fillRect/>
-          </a:stretch>
-        </p:blipFill>
-        <p:spPr>
-          <a:xfrm>
-            <a:off x="1968861" y="2533235"/>
-            <a:ext cx="703086" cy="1382173"/>
-          </a:xfrm>
-          <a:prstGeom prst="rect">
-            <a:avLst/>
-          </a:prstGeom>
-        </p:spPr>
-      </p:pic>
-      <p:pic>
-        <p:nvPicPr>
-          <p:cNvPr id="5" name="Picture 4"/>
-          <p:cNvPicPr>
-            <a:picLocks noChangeAspect="1"/>
-          </p:cNvPicPr>
-          <p:nvPr/>
-        </p:nvPicPr>
-        <p:blipFill>
-          <a:blip r:embed="rId3"/>
-          <a:stretch>
-            <a:fillRect/>
-          </a:stretch>
-        </p:blipFill>
-        <p:spPr>
-          <a:xfrm>
-            <a:off x="5568562" y="3011532"/>
-            <a:ext cx="1549984" cy="632802"/>
-          </a:xfrm>
-          <a:prstGeom prst="rect">
-            <a:avLst/>
-          </a:prstGeom>
-        </p:spPr>
-      </p:pic>
-      <p:pic>
-        <p:nvPicPr>
-          <p:cNvPr id="6" name="Picture 5"/>
-          <p:cNvPicPr>
-            <a:picLocks noChangeAspect="1"/>
-          </p:cNvPicPr>
-          <p:nvPr/>
-        </p:nvPicPr>
-        <p:blipFill>
-          <a:blip r:embed="rId4"/>
-          <a:stretch>
-            <a:fillRect/>
-          </a:stretch>
-        </p:blipFill>
-        <p:spPr>
-          <a:xfrm>
-            <a:off x="5960206" y="4845492"/>
-            <a:ext cx="1549986" cy="832635"/>
-          </a:xfrm>
-          <a:prstGeom prst="rect">
-            <a:avLst/>
-          </a:prstGeom>
-        </p:spPr>
-      </p:pic>
-      <p:pic>
-        <p:nvPicPr>
-          <p:cNvPr id="7" name="Picture 6"/>
-          <p:cNvPicPr>
-            <a:picLocks noChangeAspect="1"/>
-          </p:cNvPicPr>
-          <p:nvPr/>
-        </p:nvPicPr>
-        <p:blipFill>
-          <a:blip r:embed="rId5"/>
-          <a:stretch>
-            <a:fillRect/>
-          </a:stretch>
-        </p:blipFill>
-        <p:spPr>
-          <a:xfrm>
-            <a:off x="3937267" y="4066682"/>
-            <a:ext cx="1549984" cy="632802"/>
-          </a:xfrm>
-          <a:prstGeom prst="rect">
-            <a:avLst/>
-          </a:prstGeom>
-        </p:spPr>
-      </p:pic>
-      <p:pic>
-        <p:nvPicPr>
-          <p:cNvPr id="8" name="Picture 7"/>
-          <p:cNvPicPr>
-            <a:picLocks noChangeAspect="1"/>
-          </p:cNvPicPr>
-          <p:nvPr/>
-        </p:nvPicPr>
-        <p:blipFill>
-          <a:blip r:embed="rId6"/>
-          <a:stretch>
-            <a:fillRect/>
-          </a:stretch>
-        </p:blipFill>
-        <p:spPr>
-          <a:xfrm>
-            <a:off x="8864539" y="4291494"/>
-            <a:ext cx="1070608" cy="815981"/>
-          </a:xfrm>
-          <a:prstGeom prst="rect">
-            <a:avLst/>
-          </a:prstGeom>
-        </p:spPr>
-      </p:pic>
-      <p:pic>
-        <p:nvPicPr>
-          <p:cNvPr id="9" name="Picture 8"/>
-          <p:cNvPicPr>
-            <a:picLocks noChangeAspect="1"/>
-          </p:cNvPicPr>
-          <p:nvPr/>
-        </p:nvPicPr>
-        <p:blipFill>
-          <a:blip r:embed="rId7"/>
-          <a:stretch>
-            <a:fillRect/>
-          </a:stretch>
-        </p:blipFill>
-        <p:spPr>
-          <a:xfrm>
-            <a:off x="8848165" y="2533235"/>
-            <a:ext cx="1070608" cy="1115729"/>
-          </a:xfrm>
-          <a:prstGeom prst="rect">
-            <a:avLst/>
-          </a:prstGeom>
-        </p:spPr>
-      </p:pic>
-      <p:cxnSp>
-        <p:nvCxnSpPr>
-          <p:cNvPr id="26" name="Straight Connector 25"/>
-          <p:cNvCxnSpPr/>
-          <p:nvPr/>
-        </p:nvCxnSpPr>
-        <p:spPr>
-          <a:xfrm flipH="1">
-            <a:off x="5133464" y="3570322"/>
-            <a:ext cx="1051460" cy="526890"/>
-          </a:xfrm>
-          <a:prstGeom prst="line">
-            <a:avLst/>
-          </a:prstGeom>
-          <a:ln w="12700">
-            <a:solidFill>
-              <a:schemeClr val="accent4"/>
-            </a:solidFill>
-            <a:prstDash val="dash"/>
-            <a:tailEnd type="arrow" w="lg" len="lg"/>
-          </a:ln>
-        </p:spPr>
-        <p:style>
-          <a:lnRef idx="1">
-            <a:schemeClr val="accent1"/>
-          </a:lnRef>
-          <a:fillRef idx="0">
-            <a:schemeClr val="accent1"/>
-          </a:fillRef>
-          <a:effectRef idx="0">
-            <a:schemeClr val="accent1"/>
-          </a:effectRef>
-          <a:fontRef idx="minor">
-            <a:schemeClr val="tx1"/>
-          </a:fontRef>
-        </p:style>
-      </p:cxnSp>
-      <p:sp>
-        <p:nvSpPr>
-          <p:cNvPr id="27" name="TextBox 26"/>
-          <p:cNvSpPr txBox="1"/>
-          <p:nvPr/>
-        </p:nvSpPr>
-        <p:spPr>
-          <a:xfrm>
-            <a:off x="5092974" y="3709821"/>
-            <a:ext cx="983226" cy="246221"/>
-          </a:xfrm>
-          <a:prstGeom prst="rect">
-            <a:avLst/>
-          </a:prstGeom>
-          <a:noFill/>
-        </p:spPr>
-        <p:txBody>
-          <a:bodyPr wrap="square" rtlCol="0">
-            <a:spAutoFit/>
-          </a:bodyPr>
-          <a:lstStyle/>
-          <a:p>
-            <a:pPr algn="ctr"/>
-            <a:r>
-              <a:rPr lang="en-US" sz="1000" dirty="0" smtClean="0">
-                <a:solidFill>
-                  <a:srgbClr val="FFFF00"/>
-                </a:solidFill>
-              </a:rPr>
-              <a:t>&lt;&lt;include&gt;&gt;</a:t>
-            </a:r>
-            <a:endParaRPr lang="en-US" sz="1000" dirty="0">
-              <a:solidFill>
-                <a:srgbClr val="FFFF00"/>
-              </a:solidFill>
-            </a:endParaRPr>
-          </a:p>
-        </p:txBody>
-      </p:sp>
-      <p:cxnSp>
-        <p:nvCxnSpPr>
-          <p:cNvPr id="29" name="Straight Connector 28"/>
-          <p:cNvCxnSpPr>
-            <a:endCxn id="6" idx="0"/>
-          </p:cNvCxnSpPr>
-          <p:nvPr/>
-        </p:nvCxnSpPr>
-        <p:spPr>
-          <a:xfrm>
-            <a:off x="6558116" y="3592003"/>
-            <a:ext cx="177083" cy="1253489"/>
-          </a:xfrm>
-          <a:prstGeom prst="line">
-            <a:avLst/>
-          </a:prstGeom>
-          <a:ln w="12700">
-            <a:solidFill>
-              <a:schemeClr val="accent4"/>
-            </a:solidFill>
-            <a:prstDash val="dash"/>
-            <a:tailEnd type="arrow" w="lg" len="lg"/>
-          </a:ln>
-        </p:spPr>
-        <p:style>
-          <a:lnRef idx="1">
-            <a:schemeClr val="accent1"/>
-          </a:lnRef>
-          <a:fillRef idx="0">
-            <a:schemeClr val="accent1"/>
-          </a:fillRef>
-          <a:effectRef idx="0">
-            <a:schemeClr val="accent1"/>
-          </a:effectRef>
-          <a:fontRef idx="minor">
-            <a:schemeClr val="tx1"/>
-          </a:fontRef>
-        </p:style>
-      </p:cxnSp>
-      <p:sp>
-        <p:nvSpPr>
-          <p:cNvPr id="30" name="TextBox 29"/>
-          <p:cNvSpPr txBox="1"/>
-          <p:nvPr/>
-        </p:nvSpPr>
-        <p:spPr>
-          <a:xfrm>
-            <a:off x="6114197" y="4045816"/>
-            <a:ext cx="983226" cy="246221"/>
-          </a:xfrm>
-          <a:prstGeom prst="rect">
-            <a:avLst/>
-          </a:prstGeom>
-          <a:noFill/>
-        </p:spPr>
-        <p:txBody>
-          <a:bodyPr wrap="square" rtlCol="0">
-            <a:spAutoFit/>
-          </a:bodyPr>
-          <a:lstStyle/>
-          <a:p>
-            <a:pPr algn="ctr"/>
-            <a:r>
-              <a:rPr lang="en-US" sz="1000" dirty="0" smtClean="0">
-                <a:solidFill>
-                  <a:srgbClr val="FFFF00"/>
-                </a:solidFill>
-              </a:rPr>
-              <a:t>&lt;&lt;include&gt;&gt;</a:t>
-            </a:r>
-            <a:endParaRPr lang="en-US" sz="1000" dirty="0">
-              <a:solidFill>
-                <a:srgbClr val="FFFF00"/>
-              </a:solidFill>
-            </a:endParaRPr>
-          </a:p>
-        </p:txBody>
-      </p:sp>
-    </p:spTree>
-    <p:extLst>
-      <p:ext uri="{BB962C8B-B14F-4D97-AF65-F5344CB8AC3E}">
-        <p14:creationId xmlns:p14="http://schemas.microsoft.com/office/powerpoint/2010/main" val="2473677034"/>
-      </p:ext>
-    </p:extLst>
-  </p:cSld>
-  <p:clrMapOvr>
-    <a:masterClrMapping/>
-  </p:clrMapOvr>
-  <p:transition spd="slow">
-    <p:wipe dir="r"/>
-  </p:transition>
-  <p:timing>
-    <p:tnLst>
-      <p:par>
-        <p:cTn id="1" dur="indefinite" restart="never" nodeType="tmRoot">
-          <p:childTnLst>
-            <p:seq concurrent="1" nextAc="seek">
-              <p:cTn id="2" dur="indefinite" nodeType="mainSeq">
-                <p:childTnLst>
-                  <p:par>
-                    <p:cTn id="3" fill="hold">
-                      <p:stCondLst>
-                        <p:cond delay="indefinite"/>
-                      </p:stCondLst>
-                      <p:childTnLst>
-                        <p:par>
-                          <p:cTn id="4" fill="hold">
-                            <p:stCondLst>
-                              <p:cond delay="0"/>
-                            </p:stCondLst>
-                            <p:childTnLst>
-                              <p:par>
-                                <p:cTn id="5" presetID="22" presetClass="entr" presetSubtype="8" fill="hold" nodeType="clickEffect">
-                                  <p:stCondLst>
-                                    <p:cond delay="0"/>
-                                  </p:stCondLst>
-                                  <p:childTnLst>
-                                    <p:set>
-                                      <p:cBhvr>
-                                        <p:cTn id="6" dur="1" fill="hold">
-                                          <p:stCondLst>
-                                            <p:cond delay="0"/>
-                                          </p:stCondLst>
-                                        </p:cTn>
-                                        <p:tgtEl>
-                                          <p:spTgt spid="21"/>
-                                        </p:tgtEl>
-                                        <p:attrNameLst>
-                                          <p:attrName>style.visibility</p:attrName>
-                                        </p:attrNameLst>
-                                      </p:cBhvr>
-                                      <p:to>
-                                        <p:strVal val="visible"/>
-                                      </p:to>
-                                    </p:set>
-                                    <p:animEffect transition="in" filter="wipe(left)">
-                                      <p:cBhvr>
-                                        <p:cTn id="7" dur="500"/>
-                                        <p:tgtEl>
-                                          <p:spTgt spid="21"/>
-                                        </p:tgtEl>
-                                      </p:cBhvr>
-                                    </p:animEffect>
-                                  </p:childTnLst>
-                                </p:cTn>
-                              </p:par>
-                              <p:par>
-                                <p:cTn id="8" presetID="22" presetClass="entr" presetSubtype="8" fill="hold" nodeType="withEffect">
-                                  <p:stCondLst>
-                                    <p:cond delay="0"/>
-                                  </p:stCondLst>
-                                  <p:childTnLst>
-                                    <p:set>
-                                      <p:cBhvr>
-                                        <p:cTn id="9" dur="1" fill="hold">
-                                          <p:stCondLst>
-                                            <p:cond delay="0"/>
-                                          </p:stCondLst>
-                                        </p:cTn>
-                                        <p:tgtEl>
-                                          <p:spTgt spid="7"/>
-                                        </p:tgtEl>
-                                        <p:attrNameLst>
-                                          <p:attrName>style.visibility</p:attrName>
-                                        </p:attrNameLst>
-                                      </p:cBhvr>
-                                      <p:to>
-                                        <p:strVal val="visible"/>
-                                      </p:to>
-                                    </p:set>
-                                    <p:animEffect transition="in" filter="wipe(left)">
-                                      <p:cBhvr>
-                                        <p:cTn id="10" dur="500"/>
-                                        <p:tgtEl>
-                                          <p:spTgt spid="7"/>
-                                        </p:tgtEl>
-                                      </p:cBhvr>
-                                    </p:animEffect>
-                                  </p:childTnLst>
-                                </p:cTn>
-                              </p:par>
-                              <p:par>
-                                <p:cTn id="11" presetID="22" presetClass="entr" presetSubtype="8" fill="hold" grpId="0" nodeType="withEffect">
-                                  <p:stCondLst>
-                                    <p:cond delay="0"/>
-                                  </p:stCondLst>
-                                  <p:childTnLst>
-                                    <p:set>
-                                      <p:cBhvr>
-                                        <p:cTn id="12" dur="1" fill="hold">
-                                          <p:stCondLst>
-                                            <p:cond delay="0"/>
-                                          </p:stCondLst>
-                                        </p:cTn>
-                                        <p:tgtEl>
-                                          <p:spTgt spid="27"/>
-                                        </p:tgtEl>
-                                        <p:attrNameLst>
-                                          <p:attrName>style.visibility</p:attrName>
-                                        </p:attrNameLst>
-                                      </p:cBhvr>
-                                      <p:to>
-                                        <p:strVal val="visible"/>
-                                      </p:to>
-                                    </p:set>
-                                    <p:animEffect transition="in" filter="wipe(left)">
-                                      <p:cBhvr>
-                                        <p:cTn id="13" dur="500"/>
-                                        <p:tgtEl>
-                                          <p:spTgt spid="27"/>
-                                        </p:tgtEl>
-                                      </p:cBhvr>
-                                    </p:animEffect>
-                                  </p:childTnLst>
-                                </p:cTn>
-                              </p:par>
-                              <p:par>
-                                <p:cTn id="14" presetID="22" presetClass="entr" presetSubtype="8" fill="hold" nodeType="withEffect">
-                                  <p:stCondLst>
-                                    <p:cond delay="0"/>
-                                  </p:stCondLst>
-                                  <p:childTnLst>
-                                    <p:set>
-                                      <p:cBhvr>
-                                        <p:cTn id="15" dur="1" fill="hold">
-                                          <p:stCondLst>
-                                            <p:cond delay="0"/>
-                                          </p:stCondLst>
-                                        </p:cTn>
-                                        <p:tgtEl>
-                                          <p:spTgt spid="26"/>
-                                        </p:tgtEl>
-                                        <p:attrNameLst>
-                                          <p:attrName>style.visibility</p:attrName>
-                                        </p:attrNameLst>
-                                      </p:cBhvr>
-                                      <p:to>
-                                        <p:strVal val="visible"/>
-                                      </p:to>
-                                    </p:set>
-                                    <p:animEffect transition="in" filter="wipe(left)">
-                                      <p:cBhvr>
-                                        <p:cTn id="16" dur="500"/>
-                                        <p:tgtEl>
-                                          <p:spTgt spid="26"/>
-                                        </p:tgtEl>
-                                      </p:cBhvr>
-                                    </p:animEffect>
-                                  </p:childTnLst>
-                                </p:cTn>
-                              </p:par>
-                            </p:childTnLst>
-                          </p:cTn>
-                        </p:par>
-                      </p:childTnLst>
-                    </p:cTn>
-                  </p:par>
-                  <p:par>
-                    <p:cTn id="17" fill="hold">
-                      <p:stCondLst>
-                        <p:cond delay="indefinite"/>
-                      </p:stCondLst>
-                      <p:childTnLst>
-                        <p:par>
-                          <p:cTn id="18" fill="hold">
-                            <p:stCondLst>
-                              <p:cond delay="0"/>
-                            </p:stCondLst>
-                            <p:childTnLst>
-                              <p:par>
-                                <p:cTn id="19" presetID="22" presetClass="entr" presetSubtype="8" fill="hold" nodeType="clickEffect">
-                                  <p:stCondLst>
-                                    <p:cond delay="0"/>
-                                  </p:stCondLst>
-                                  <p:childTnLst>
-                                    <p:set>
-                                      <p:cBhvr>
-                                        <p:cTn id="20" dur="1" fill="hold">
-                                          <p:stCondLst>
-                                            <p:cond delay="0"/>
-                                          </p:stCondLst>
-                                        </p:cTn>
-                                        <p:tgtEl>
-                                          <p:spTgt spid="29"/>
-                                        </p:tgtEl>
-                                        <p:attrNameLst>
-                                          <p:attrName>style.visibility</p:attrName>
-                                        </p:attrNameLst>
-                                      </p:cBhvr>
-                                      <p:to>
-                                        <p:strVal val="visible"/>
-                                      </p:to>
-                                    </p:set>
-                                    <p:animEffect transition="in" filter="wipe(left)">
-                                      <p:cBhvr>
-                                        <p:cTn id="21" dur="500"/>
-                                        <p:tgtEl>
-                                          <p:spTgt spid="29"/>
-                                        </p:tgtEl>
-                                      </p:cBhvr>
-                                    </p:animEffect>
-                                  </p:childTnLst>
-                                </p:cTn>
-                              </p:par>
-                              <p:par>
-                                <p:cTn id="22" presetID="22" presetClass="entr" presetSubtype="8" fill="hold" grpId="0" nodeType="withEffect">
-                                  <p:stCondLst>
-                                    <p:cond delay="0"/>
-                                  </p:stCondLst>
-                                  <p:childTnLst>
-                                    <p:set>
-                                      <p:cBhvr>
-                                        <p:cTn id="23" dur="1" fill="hold">
-                                          <p:stCondLst>
-                                            <p:cond delay="0"/>
-                                          </p:stCondLst>
-                                        </p:cTn>
-                                        <p:tgtEl>
-                                          <p:spTgt spid="30"/>
-                                        </p:tgtEl>
-                                        <p:attrNameLst>
-                                          <p:attrName>style.visibility</p:attrName>
-                                        </p:attrNameLst>
-                                      </p:cBhvr>
-                                      <p:to>
-                                        <p:strVal val="visible"/>
-                                      </p:to>
-                                    </p:set>
-                                    <p:animEffect transition="in" filter="wipe(left)">
-                                      <p:cBhvr>
-                                        <p:cTn id="24" dur="500"/>
-                                        <p:tgtEl>
-                                          <p:spTgt spid="30"/>
-                                        </p:tgtEl>
-                                      </p:cBhvr>
-                                    </p:animEffect>
-                                  </p:childTnLst>
-                                </p:cTn>
-                              </p:par>
-                              <p:par>
-                                <p:cTn id="25" presetID="22" presetClass="entr" presetSubtype="8" fill="hold" nodeType="withEffect">
-                                  <p:stCondLst>
-                                    <p:cond delay="0"/>
-                                  </p:stCondLst>
-                                  <p:childTnLst>
-                                    <p:set>
-                                      <p:cBhvr>
-                                        <p:cTn id="26" dur="1" fill="hold">
-                                          <p:stCondLst>
-                                            <p:cond delay="0"/>
-                                          </p:stCondLst>
-                                        </p:cTn>
-                                        <p:tgtEl>
-                                          <p:spTgt spid="6"/>
-                                        </p:tgtEl>
-                                        <p:attrNameLst>
-                                          <p:attrName>style.visibility</p:attrName>
-                                        </p:attrNameLst>
-                                      </p:cBhvr>
-                                      <p:to>
-                                        <p:strVal val="visible"/>
-                                      </p:to>
-                                    </p:set>
-                                    <p:animEffect transition="in" filter="wipe(left)">
-                                      <p:cBhvr>
-                                        <p:cTn id="27" dur="500"/>
-                                        <p:tgtEl>
-                                          <p:spTgt spid="6"/>
-                                        </p:tgtEl>
-                                      </p:cBhvr>
-                                    </p:animEffect>
-                                  </p:childTnLst>
-                                </p:cTn>
-                              </p:par>
-                              <p:par>
-                                <p:cTn id="28" presetID="22" presetClass="entr" presetSubtype="8" fill="hold" nodeType="withEffect">
-                                  <p:stCondLst>
-                                    <p:cond delay="0"/>
-                                  </p:stCondLst>
-                                  <p:childTnLst>
-                                    <p:set>
-                                      <p:cBhvr>
-                                        <p:cTn id="29" dur="1" fill="hold">
-                                          <p:stCondLst>
-                                            <p:cond delay="0"/>
-                                          </p:stCondLst>
-                                        </p:cTn>
-                                        <p:tgtEl>
-                                          <p:spTgt spid="23"/>
-                                        </p:tgtEl>
-                                        <p:attrNameLst>
-                                          <p:attrName>style.visibility</p:attrName>
-                                        </p:attrNameLst>
-                                      </p:cBhvr>
-                                      <p:to>
-                                        <p:strVal val="visible"/>
-                                      </p:to>
-                                    </p:set>
-                                    <p:animEffect transition="in" filter="wipe(left)">
-                                      <p:cBhvr>
-                                        <p:cTn id="30" dur="500"/>
-                                        <p:tgtEl>
-                                          <p:spTgt spid="23"/>
-                                        </p:tgtEl>
-                                      </p:cBhvr>
-                                    </p:animEffect>
-                                  </p:childTnLst>
-                                </p:cTn>
-                              </p:par>
-                            </p:childTnLst>
-                          </p:cTn>
-                        </p:par>
-                      </p:childTnLst>
-                    </p:cTn>
-                  </p:par>
-                  <p:par>
-                    <p:cTn id="31" fill="hold">
-                      <p:stCondLst>
-                        <p:cond delay="indefinite"/>
-                      </p:stCondLst>
-                      <p:childTnLst>
-                        <p:par>
-                          <p:cTn id="32" fill="hold">
-                            <p:stCondLst>
-                              <p:cond delay="0"/>
-                            </p:stCondLst>
-                            <p:childTnLst>
-                              <p:par>
-                                <p:cTn id="33" presetID="22" presetClass="entr" presetSubtype="8" fill="hold" nodeType="clickEffect">
-                                  <p:stCondLst>
-                                    <p:cond delay="0"/>
-                                  </p:stCondLst>
-                                  <p:childTnLst>
-                                    <p:set>
-                                      <p:cBhvr>
-                                        <p:cTn id="34" dur="1" fill="hold">
-                                          <p:stCondLst>
-                                            <p:cond delay="0"/>
-                                          </p:stCondLst>
-                                        </p:cTn>
-                                        <p:tgtEl>
-                                          <p:spTgt spid="16"/>
-                                        </p:tgtEl>
-                                        <p:attrNameLst>
-                                          <p:attrName>style.visibility</p:attrName>
-                                        </p:attrNameLst>
-                                      </p:cBhvr>
-                                      <p:to>
-                                        <p:strVal val="visible"/>
-                                      </p:to>
-                                    </p:set>
-                                    <p:animEffect transition="in" filter="wipe(left)">
-                                      <p:cBhvr>
-                                        <p:cTn id="35" dur="500"/>
-                                        <p:tgtEl>
-                                          <p:spTgt spid="16"/>
-                                        </p:tgtEl>
-                                      </p:cBhvr>
-                                    </p:animEffect>
-                                  </p:childTnLst>
-                                </p:cTn>
-                              </p:par>
-                              <p:par>
-                                <p:cTn id="36" presetID="22" presetClass="entr" presetSubtype="8" fill="hold" nodeType="withEffect">
-                                  <p:stCondLst>
-                                    <p:cond delay="0"/>
-                                  </p:stCondLst>
-                                  <p:childTnLst>
-                                    <p:set>
-                                      <p:cBhvr>
-                                        <p:cTn id="37" dur="1" fill="hold">
-                                          <p:stCondLst>
-                                            <p:cond delay="0"/>
-                                          </p:stCondLst>
-                                        </p:cTn>
-                                        <p:tgtEl>
-                                          <p:spTgt spid="9"/>
-                                        </p:tgtEl>
-                                        <p:attrNameLst>
-                                          <p:attrName>style.visibility</p:attrName>
-                                        </p:attrNameLst>
-                                      </p:cBhvr>
-                                      <p:to>
-                                        <p:strVal val="visible"/>
-                                      </p:to>
-                                    </p:set>
-                                    <p:animEffect transition="in" filter="wipe(left)">
-                                      <p:cBhvr>
-                                        <p:cTn id="38" dur="500"/>
-                                        <p:tgtEl>
-                                          <p:spTgt spid="9"/>
-                                        </p:tgtEl>
-                                      </p:cBhvr>
-                                    </p:animEffect>
-                                  </p:childTnLst>
-                                </p:cTn>
-                              </p:par>
-                            </p:childTnLst>
-                          </p:cTn>
-                        </p:par>
-                      </p:childTnLst>
-                    </p:cTn>
-                  </p:par>
-                </p:childTnLst>
-              </p:cTn>
-              <p:prevCondLst>
-                <p:cond evt="onPrev" delay="0">
-                  <p:tgtEl>
-                    <p:sldTgt/>
-                  </p:tgtEl>
-                </p:cond>
-              </p:prevCondLst>
-              <p:nextCondLst>
-                <p:cond evt="onNext" delay="0">
-                  <p:tgtEl>
-                    <p:sldTgt/>
-                  </p:tgtEl>
-                </p:cond>
-              </p:nextCondLst>
-            </p:seq>
-          </p:childTnLst>
-        </p:cTn>
-      </p:par>
-    </p:tnLst>
-    <p:bldLst>
-      <p:bldP spid="27" grpId="0"/>
-      <p:bldP spid="30" grpId="0"/>
-    </p:bldLst>
-  </p:timing>
-</p:sld>
-</file>
-
 <file path=ppt/slides/slide13.xml><?xml version="1.0" encoding="utf-8"?>
-<p:sld xmlns:a="http://schemas.openxmlformats.org/drawingml/2006/main" xmlns:r="http://schemas.openxmlformats.org/officeDocument/2006/relationships" xmlns:p="http://schemas.openxmlformats.org/presentationml/2006/main">
-  <p:cSld>
-    <p:spTree>
-      <p:nvGrpSpPr>
-        <p:cNvPr id="1" name=""/>
-        <p:cNvGrpSpPr/>
-        <p:nvPr/>
-      </p:nvGrpSpPr>
-      <p:grpSpPr>
-        <a:xfrm>
-          <a:off x="0" y="0"/>
-          <a:ext cx="0" cy="0"/>
-          <a:chOff x="0" y="0"/>
-          <a:chExt cx="0" cy="0"/>
-        </a:xfrm>
-      </p:grpSpPr>
-      <p:sp>
-        <p:nvSpPr>
-          <p:cNvPr id="2" name="Title 1"/>
-          <p:cNvSpPr>
-            <a:spLocks noGrp="1"/>
-          </p:cNvSpPr>
-          <p:nvPr>
-            <p:ph type="title"/>
-          </p:nvPr>
-        </p:nvSpPr>
-        <p:spPr/>
-        <p:txBody>
-          <a:bodyPr/>
-          <a:lstStyle/>
-          <a:p>
-            <a:r>
-              <a:rPr lang="en-US" dirty="0" smtClean="0"/>
-              <a:t>Phone Screens from UI Prototype</a:t>
-            </a:r>
-            <a:endParaRPr lang="en-US" dirty="0"/>
-          </a:p>
-        </p:txBody>
-      </p:sp>
-      <p:sp>
-        <p:nvSpPr>
-          <p:cNvPr id="8" name="TextBox 7"/>
-          <p:cNvSpPr txBox="1"/>
-          <p:nvPr/>
-        </p:nvSpPr>
-        <p:spPr>
-          <a:xfrm>
-            <a:off x="680321" y="2779776"/>
-            <a:ext cx="2050687" cy="461665"/>
-          </a:xfrm>
-          <a:prstGeom prst="rect">
-            <a:avLst/>
-          </a:prstGeom>
-          <a:noFill/>
-        </p:spPr>
-        <p:txBody>
-          <a:bodyPr wrap="square" rtlCol="0">
-            <a:spAutoFit/>
-          </a:bodyPr>
-          <a:lstStyle/>
-          <a:p>
-            <a:pPr algn="ctr"/>
-            <a:r>
-              <a:rPr lang="en-US" sz="2400" dirty="0" smtClean="0"/>
-              <a:t>Splash Screen</a:t>
-            </a:r>
-            <a:endParaRPr lang="en-US" sz="2400" dirty="0"/>
-          </a:p>
-        </p:txBody>
-      </p:sp>
-      <p:sp>
-        <p:nvSpPr>
-          <p:cNvPr id="10" name="TextBox 9"/>
-          <p:cNvSpPr txBox="1"/>
-          <p:nvPr/>
-        </p:nvSpPr>
-        <p:spPr>
-          <a:xfrm>
-            <a:off x="3055202" y="2779776"/>
-            <a:ext cx="2050687" cy="461665"/>
-          </a:xfrm>
-          <a:prstGeom prst="rect">
-            <a:avLst/>
-          </a:prstGeom>
-          <a:noFill/>
-        </p:spPr>
-        <p:txBody>
-          <a:bodyPr wrap="square" rtlCol="0">
-            <a:spAutoFit/>
-          </a:bodyPr>
-          <a:lstStyle/>
-          <a:p>
-            <a:pPr algn="ctr"/>
-            <a:r>
-              <a:rPr lang="en-US" sz="2400" dirty="0" smtClean="0"/>
-              <a:t>Logon Screen</a:t>
-            </a:r>
-            <a:endParaRPr lang="en-US" sz="2400" dirty="0"/>
-          </a:p>
-        </p:txBody>
-      </p:sp>
-      <p:sp>
-        <p:nvSpPr>
-          <p:cNvPr id="11" name="TextBox 10"/>
-          <p:cNvSpPr txBox="1"/>
-          <p:nvPr/>
-        </p:nvSpPr>
-        <p:spPr>
-          <a:xfrm>
-            <a:off x="5430083" y="2779776"/>
-            <a:ext cx="2050687" cy="461665"/>
-          </a:xfrm>
-          <a:prstGeom prst="rect">
-            <a:avLst/>
-          </a:prstGeom>
-          <a:noFill/>
-        </p:spPr>
-        <p:txBody>
-          <a:bodyPr wrap="square" rtlCol="0">
-            <a:spAutoFit/>
-          </a:bodyPr>
-          <a:lstStyle/>
-          <a:p>
-            <a:pPr algn="ctr"/>
-            <a:r>
-              <a:rPr lang="en-US" sz="2400" dirty="0" smtClean="0"/>
-              <a:t>Register User</a:t>
-            </a:r>
-            <a:endParaRPr lang="en-US" sz="2400" dirty="0"/>
-          </a:p>
-        </p:txBody>
-      </p:sp>
-      <p:sp>
-        <p:nvSpPr>
-          <p:cNvPr id="12" name="TextBox 11"/>
-          <p:cNvSpPr txBox="1"/>
-          <p:nvPr/>
-        </p:nvSpPr>
-        <p:spPr>
-          <a:xfrm>
-            <a:off x="7804963" y="2779776"/>
-            <a:ext cx="2050687" cy="461665"/>
-          </a:xfrm>
-          <a:prstGeom prst="rect">
-            <a:avLst/>
-          </a:prstGeom>
-          <a:noFill/>
-        </p:spPr>
-        <p:txBody>
-          <a:bodyPr wrap="square" rtlCol="0">
-            <a:spAutoFit/>
-          </a:bodyPr>
-          <a:lstStyle/>
-          <a:p>
-            <a:pPr algn="ctr"/>
-            <a:r>
-              <a:rPr lang="en-US" sz="2400" dirty="0" smtClean="0"/>
-              <a:t>Main Menu</a:t>
-            </a:r>
-            <a:endParaRPr lang="en-US" sz="2400" dirty="0"/>
-          </a:p>
-        </p:txBody>
-      </p:sp>
-      <p:pic>
-        <p:nvPicPr>
-          <p:cNvPr id="4" name="Picture 3"/>
-          <p:cNvPicPr/>
-          <p:nvPr/>
-        </p:nvPicPr>
-        <p:blipFill>
-          <a:blip r:embed="rId2">
-            <a:extLst>
-              <a:ext uri="{28A0092B-C50C-407E-A947-70E740481C1C}">
-                <a14:useLocalDpi xmlns:a14="http://schemas.microsoft.com/office/drawing/2010/main" val="0"/>
-              </a:ext>
-            </a:extLst>
-          </a:blip>
-          <a:srcRect/>
-          <a:stretch>
-            <a:fillRect/>
-          </a:stretch>
-        </p:blipFill>
-        <p:spPr bwMode="auto">
-          <a:xfrm>
-            <a:off x="660151" y="2494247"/>
-            <a:ext cx="2101293" cy="3946924"/>
-          </a:xfrm>
-          <a:prstGeom prst="rect">
-            <a:avLst/>
-          </a:prstGeom>
-          <a:noFill/>
-          <a:ln>
-            <a:noFill/>
-          </a:ln>
-        </p:spPr>
-      </p:pic>
-      <p:pic>
-        <p:nvPicPr>
-          <p:cNvPr id="5" name="Picture 4"/>
-          <p:cNvPicPr>
-            <a:picLocks/>
-          </p:cNvPicPr>
-          <p:nvPr/>
-        </p:nvPicPr>
-        <p:blipFill>
-          <a:blip r:embed="rId3">
-            <a:extLst>
-              <a:ext uri="{28A0092B-C50C-407E-A947-70E740481C1C}">
-                <a14:useLocalDpi xmlns:a14="http://schemas.microsoft.com/office/drawing/2010/main" val="0"/>
-              </a:ext>
-            </a:extLst>
-          </a:blip>
-          <a:srcRect/>
-          <a:stretch>
-            <a:fillRect/>
-          </a:stretch>
-        </p:blipFill>
-        <p:spPr bwMode="auto">
-          <a:xfrm>
-            <a:off x="3057608" y="2491970"/>
-            <a:ext cx="2064000" cy="3930183"/>
-          </a:xfrm>
-          <a:prstGeom prst="rect">
-            <a:avLst/>
-          </a:prstGeom>
-          <a:noFill/>
-          <a:ln>
-            <a:noFill/>
-          </a:ln>
-        </p:spPr>
-      </p:pic>
-      <p:pic>
-        <p:nvPicPr>
-          <p:cNvPr id="6" name="Picture 5"/>
-          <p:cNvPicPr>
-            <a:picLocks noChangeAspect="1"/>
-          </p:cNvPicPr>
-          <p:nvPr/>
-        </p:nvPicPr>
-        <p:blipFill>
-          <a:blip r:embed="rId4">
-            <a:extLst>
-              <a:ext uri="{28A0092B-C50C-407E-A947-70E740481C1C}">
-                <a14:useLocalDpi xmlns:a14="http://schemas.microsoft.com/office/drawing/2010/main" val="0"/>
-              </a:ext>
-            </a:extLst>
-          </a:blip>
-          <a:srcRect/>
-          <a:stretch>
-            <a:fillRect/>
-          </a:stretch>
-        </p:blipFill>
-        <p:spPr bwMode="auto">
-          <a:xfrm>
-            <a:off x="5417772" y="2491970"/>
-            <a:ext cx="2070857" cy="3908571"/>
-          </a:xfrm>
-          <a:prstGeom prst="rect">
-            <a:avLst/>
-          </a:prstGeom>
-          <a:noFill/>
-          <a:ln>
-            <a:noFill/>
-          </a:ln>
-        </p:spPr>
-      </p:pic>
-      <p:pic>
-        <p:nvPicPr>
-          <p:cNvPr id="7" name="Picture 6"/>
-          <p:cNvPicPr>
-            <a:picLocks noChangeAspect="1"/>
-          </p:cNvPicPr>
-          <p:nvPr/>
-        </p:nvPicPr>
-        <p:blipFill>
-          <a:blip r:embed="rId5">
-            <a:extLst>
-              <a:ext uri="{28A0092B-C50C-407E-A947-70E740481C1C}">
-                <a14:useLocalDpi xmlns:a14="http://schemas.microsoft.com/office/drawing/2010/main" val="0"/>
-              </a:ext>
-            </a:extLst>
-          </a:blip>
-          <a:srcRect/>
-          <a:stretch>
-            <a:fillRect/>
-          </a:stretch>
-        </p:blipFill>
-        <p:spPr bwMode="auto">
-          <a:xfrm>
-            <a:off x="7784793" y="2484077"/>
-            <a:ext cx="2070857" cy="3916464"/>
-          </a:xfrm>
-          <a:prstGeom prst="rect">
-            <a:avLst/>
-          </a:prstGeom>
-          <a:noFill/>
-          <a:ln>
-            <a:noFill/>
-          </a:ln>
-        </p:spPr>
-      </p:pic>
-    </p:spTree>
-    <p:extLst>
-      <p:ext uri="{BB962C8B-B14F-4D97-AF65-F5344CB8AC3E}">
-        <p14:creationId xmlns:p14="http://schemas.microsoft.com/office/powerpoint/2010/main" val="2823644504"/>
-      </p:ext>
-    </p:extLst>
-  </p:cSld>
-  <p:clrMapOvr>
-    <a:masterClrMapping/>
-  </p:clrMapOvr>
-  <p:transition spd="slow">
-    <p:wipe dir="r"/>
-  </p:transition>
-  <p:timing>
-    <p:tnLst>
-      <p:par>
-        <p:cTn id="1" dur="indefinite" restart="never" nodeType="tmRoot">
-          <p:childTnLst>
-            <p:seq concurrent="1" nextAc="seek">
-              <p:cTn id="2" dur="indefinite" nodeType="mainSeq">
-                <p:childTnLst>
-                  <p:par>
-                    <p:cTn id="3" fill="hold">
-                      <p:stCondLst>
-                        <p:cond delay="indefinite"/>
-                      </p:stCondLst>
-                      <p:childTnLst>
-                        <p:par>
-                          <p:cTn id="4" fill="hold">
-                            <p:stCondLst>
-                              <p:cond delay="0"/>
-                            </p:stCondLst>
-                            <p:childTnLst>
-                              <p:par>
-                                <p:cTn id="5" presetID="2" presetClass="entr" presetSubtype="4" fill="hold" nodeType="clickEffect">
-                                  <p:stCondLst>
-                                    <p:cond delay="0"/>
-                                  </p:stCondLst>
-                                  <p:childTnLst>
-                                    <p:set>
-                                      <p:cBhvr>
-                                        <p:cTn id="6" dur="1" fill="hold">
-                                          <p:stCondLst>
-                                            <p:cond delay="0"/>
-                                          </p:stCondLst>
-                                        </p:cTn>
-                                        <p:tgtEl>
-                                          <p:spTgt spid="4"/>
-                                        </p:tgtEl>
-                                        <p:attrNameLst>
-                                          <p:attrName>style.visibility</p:attrName>
-                                        </p:attrNameLst>
-                                      </p:cBhvr>
-                                      <p:to>
-                                        <p:strVal val="visible"/>
-                                      </p:to>
-                                    </p:set>
-                                    <p:anim calcmode="lin" valueType="num">
-                                      <p:cBhvr additive="base">
-                                        <p:cTn id="7" dur="500" fill="hold"/>
-                                        <p:tgtEl>
-                                          <p:spTgt spid="4"/>
-                                        </p:tgtEl>
-                                        <p:attrNameLst>
-                                          <p:attrName>ppt_x</p:attrName>
-                                        </p:attrNameLst>
-                                      </p:cBhvr>
-                                      <p:tavLst>
-                                        <p:tav tm="0">
-                                          <p:val>
-                                            <p:strVal val="#ppt_x"/>
-                                          </p:val>
-                                        </p:tav>
-                                        <p:tav tm="100000">
-                                          <p:val>
-                                            <p:strVal val="#ppt_x"/>
-                                          </p:val>
-                                        </p:tav>
-                                      </p:tavLst>
-                                    </p:anim>
-                                    <p:anim calcmode="lin" valueType="num">
-                                      <p:cBhvr additive="base">
-                                        <p:cTn id="8" dur="500" fill="hold"/>
-                                        <p:tgtEl>
-                                          <p:spTgt spid="4"/>
-                                        </p:tgtEl>
-                                        <p:attrNameLst>
-                                          <p:attrName>ppt_y</p:attrName>
-                                        </p:attrNameLst>
-                                      </p:cBhvr>
-                                      <p:tavLst>
-                                        <p:tav tm="0">
-                                          <p:val>
-                                            <p:strVal val="1+#ppt_h/2"/>
-                                          </p:val>
-                                        </p:tav>
-                                        <p:tav tm="100000">
-                                          <p:val>
-                                            <p:strVal val="#ppt_y"/>
-                                          </p:val>
-                                        </p:tav>
-                                      </p:tavLst>
-                                    </p:anim>
-                                  </p:childTnLst>
-                                </p:cTn>
-                              </p:par>
-                            </p:childTnLst>
-                          </p:cTn>
-                        </p:par>
-                      </p:childTnLst>
-                    </p:cTn>
-                  </p:par>
-                  <p:par>
-                    <p:cTn id="9" fill="hold">
-                      <p:stCondLst>
-                        <p:cond delay="indefinite"/>
-                      </p:stCondLst>
-                      <p:childTnLst>
-                        <p:par>
-                          <p:cTn id="10" fill="hold">
-                            <p:stCondLst>
-                              <p:cond delay="0"/>
-                            </p:stCondLst>
-                            <p:childTnLst>
-                              <p:par>
-                                <p:cTn id="11" presetID="2" presetClass="entr" presetSubtype="4" fill="hold" grpId="0" nodeType="clickEffect">
-                                  <p:stCondLst>
-                                    <p:cond delay="0"/>
-                                  </p:stCondLst>
-                                  <p:childTnLst>
-                                    <p:set>
-                                      <p:cBhvr>
-                                        <p:cTn id="12" dur="1" fill="hold">
-                                          <p:stCondLst>
-                                            <p:cond delay="0"/>
-                                          </p:stCondLst>
-                                        </p:cTn>
-                                        <p:tgtEl>
-                                          <p:spTgt spid="10"/>
-                                        </p:tgtEl>
-                                        <p:attrNameLst>
-                                          <p:attrName>style.visibility</p:attrName>
-                                        </p:attrNameLst>
-                                      </p:cBhvr>
-                                      <p:to>
-                                        <p:strVal val="visible"/>
-                                      </p:to>
-                                    </p:set>
-                                    <p:anim calcmode="lin" valueType="num">
-                                      <p:cBhvr additive="base">
-                                        <p:cTn id="13" dur="500" fill="hold"/>
-                                        <p:tgtEl>
-                                          <p:spTgt spid="10"/>
-                                        </p:tgtEl>
-                                        <p:attrNameLst>
-                                          <p:attrName>ppt_x</p:attrName>
-                                        </p:attrNameLst>
-                                      </p:cBhvr>
-                                      <p:tavLst>
-                                        <p:tav tm="0">
-                                          <p:val>
-                                            <p:strVal val="#ppt_x"/>
-                                          </p:val>
-                                        </p:tav>
-                                        <p:tav tm="100000">
-                                          <p:val>
-                                            <p:strVal val="#ppt_x"/>
-                                          </p:val>
-                                        </p:tav>
-                                      </p:tavLst>
-                                    </p:anim>
-                                    <p:anim calcmode="lin" valueType="num">
-                                      <p:cBhvr additive="base">
-                                        <p:cTn id="14" dur="500" fill="hold"/>
-                                        <p:tgtEl>
-                                          <p:spTgt spid="10"/>
-                                        </p:tgtEl>
-                                        <p:attrNameLst>
-                                          <p:attrName>ppt_y</p:attrName>
-                                        </p:attrNameLst>
-                                      </p:cBhvr>
-                                      <p:tavLst>
-                                        <p:tav tm="0">
-                                          <p:val>
-                                            <p:strVal val="1+#ppt_h/2"/>
-                                          </p:val>
-                                        </p:tav>
-                                        <p:tav tm="100000">
-                                          <p:val>
-                                            <p:strVal val="#ppt_y"/>
-                                          </p:val>
-                                        </p:tav>
-                                      </p:tavLst>
-                                    </p:anim>
-                                  </p:childTnLst>
-                                </p:cTn>
-                              </p:par>
-                            </p:childTnLst>
-                          </p:cTn>
-                        </p:par>
-                      </p:childTnLst>
-                    </p:cTn>
-                  </p:par>
-                  <p:par>
-                    <p:cTn id="15" fill="hold">
-                      <p:stCondLst>
-                        <p:cond delay="indefinite"/>
-                      </p:stCondLst>
-                      <p:childTnLst>
-                        <p:par>
-                          <p:cTn id="16" fill="hold">
-                            <p:stCondLst>
-                              <p:cond delay="0"/>
-                            </p:stCondLst>
-                            <p:childTnLst>
-                              <p:par>
-                                <p:cTn id="17" presetID="2" presetClass="entr" presetSubtype="4" fill="hold" nodeType="clickEffect">
-                                  <p:stCondLst>
-                                    <p:cond delay="0"/>
-                                  </p:stCondLst>
-                                  <p:childTnLst>
-                                    <p:set>
-                                      <p:cBhvr>
-                                        <p:cTn id="18" dur="1" fill="hold">
-                                          <p:stCondLst>
-                                            <p:cond delay="0"/>
-                                          </p:stCondLst>
-                                        </p:cTn>
-                                        <p:tgtEl>
-                                          <p:spTgt spid="5"/>
-                                        </p:tgtEl>
-                                        <p:attrNameLst>
-                                          <p:attrName>style.visibility</p:attrName>
-                                        </p:attrNameLst>
-                                      </p:cBhvr>
-                                      <p:to>
-                                        <p:strVal val="visible"/>
-                                      </p:to>
-                                    </p:set>
-                                    <p:anim calcmode="lin" valueType="num">
-                                      <p:cBhvr additive="base">
-                                        <p:cTn id="19" dur="500" fill="hold"/>
-                                        <p:tgtEl>
-                                          <p:spTgt spid="5"/>
-                                        </p:tgtEl>
-                                        <p:attrNameLst>
-                                          <p:attrName>ppt_x</p:attrName>
-                                        </p:attrNameLst>
-                                      </p:cBhvr>
-                                      <p:tavLst>
-                                        <p:tav tm="0">
-                                          <p:val>
-                                            <p:strVal val="#ppt_x"/>
-                                          </p:val>
-                                        </p:tav>
-                                        <p:tav tm="100000">
-                                          <p:val>
-                                            <p:strVal val="#ppt_x"/>
-                                          </p:val>
-                                        </p:tav>
-                                      </p:tavLst>
-                                    </p:anim>
-                                    <p:anim calcmode="lin" valueType="num">
-                                      <p:cBhvr additive="base">
-                                        <p:cTn id="20" dur="500" fill="hold"/>
-                                        <p:tgtEl>
-                                          <p:spTgt spid="5"/>
-                                        </p:tgtEl>
-                                        <p:attrNameLst>
-                                          <p:attrName>ppt_y</p:attrName>
-                                        </p:attrNameLst>
-                                      </p:cBhvr>
-                                      <p:tavLst>
-                                        <p:tav tm="0">
-                                          <p:val>
-                                            <p:strVal val="1+#ppt_h/2"/>
-                                          </p:val>
-                                        </p:tav>
-                                        <p:tav tm="100000">
-                                          <p:val>
-                                            <p:strVal val="#ppt_y"/>
-                                          </p:val>
-                                        </p:tav>
-                                      </p:tavLst>
-                                    </p:anim>
-                                  </p:childTnLst>
-                                </p:cTn>
-                              </p:par>
-                            </p:childTnLst>
-                          </p:cTn>
-                        </p:par>
-                      </p:childTnLst>
-                    </p:cTn>
-                  </p:par>
-                  <p:par>
-                    <p:cTn id="21" fill="hold">
-                      <p:stCondLst>
-                        <p:cond delay="indefinite"/>
-                      </p:stCondLst>
-                      <p:childTnLst>
-                        <p:par>
-                          <p:cTn id="22" fill="hold">
-                            <p:stCondLst>
-                              <p:cond delay="0"/>
-                            </p:stCondLst>
-                            <p:childTnLst>
-                              <p:par>
-                                <p:cTn id="23" presetID="2" presetClass="entr" presetSubtype="4" fill="hold" grpId="0" nodeType="clickEffect">
-                                  <p:stCondLst>
-                                    <p:cond delay="0"/>
-                                  </p:stCondLst>
-                                  <p:childTnLst>
-                                    <p:set>
-                                      <p:cBhvr>
-                                        <p:cTn id="24" dur="1" fill="hold">
-                                          <p:stCondLst>
-                                            <p:cond delay="0"/>
-                                          </p:stCondLst>
-                                        </p:cTn>
-                                        <p:tgtEl>
-                                          <p:spTgt spid="11"/>
-                                        </p:tgtEl>
-                                        <p:attrNameLst>
-                                          <p:attrName>style.visibility</p:attrName>
-                                        </p:attrNameLst>
-                                      </p:cBhvr>
-                                      <p:to>
-                                        <p:strVal val="visible"/>
-                                      </p:to>
-                                    </p:set>
-                                    <p:anim calcmode="lin" valueType="num">
-                                      <p:cBhvr additive="base">
-                                        <p:cTn id="25" dur="500" fill="hold"/>
-                                        <p:tgtEl>
-                                          <p:spTgt spid="11"/>
-                                        </p:tgtEl>
-                                        <p:attrNameLst>
-                                          <p:attrName>ppt_x</p:attrName>
-                                        </p:attrNameLst>
-                                      </p:cBhvr>
-                                      <p:tavLst>
-                                        <p:tav tm="0">
-                                          <p:val>
-                                            <p:strVal val="#ppt_x"/>
-                                          </p:val>
-                                        </p:tav>
-                                        <p:tav tm="100000">
-                                          <p:val>
-                                            <p:strVal val="#ppt_x"/>
-                                          </p:val>
-                                        </p:tav>
-                                      </p:tavLst>
-                                    </p:anim>
-                                    <p:anim calcmode="lin" valueType="num">
-                                      <p:cBhvr additive="base">
-                                        <p:cTn id="26" dur="500" fill="hold"/>
-                                        <p:tgtEl>
-                                          <p:spTgt spid="11"/>
-                                        </p:tgtEl>
-                                        <p:attrNameLst>
-                                          <p:attrName>ppt_y</p:attrName>
-                                        </p:attrNameLst>
-                                      </p:cBhvr>
-                                      <p:tavLst>
-                                        <p:tav tm="0">
-                                          <p:val>
-                                            <p:strVal val="1+#ppt_h/2"/>
-                                          </p:val>
-                                        </p:tav>
-                                        <p:tav tm="100000">
-                                          <p:val>
-                                            <p:strVal val="#ppt_y"/>
-                                          </p:val>
-                                        </p:tav>
-                                      </p:tavLst>
-                                    </p:anim>
-                                  </p:childTnLst>
-                                </p:cTn>
-                              </p:par>
-                            </p:childTnLst>
-                          </p:cTn>
-                        </p:par>
-                      </p:childTnLst>
-                    </p:cTn>
-                  </p:par>
-                  <p:par>
-                    <p:cTn id="27" fill="hold">
-                      <p:stCondLst>
-                        <p:cond delay="indefinite"/>
-                      </p:stCondLst>
-                      <p:childTnLst>
-                        <p:par>
-                          <p:cTn id="28" fill="hold">
-                            <p:stCondLst>
-                              <p:cond delay="0"/>
-                            </p:stCondLst>
-                            <p:childTnLst>
-                              <p:par>
-                                <p:cTn id="29" presetID="2" presetClass="entr" presetSubtype="4" fill="hold" nodeType="clickEffect">
-                                  <p:stCondLst>
-                                    <p:cond delay="0"/>
-                                  </p:stCondLst>
-                                  <p:childTnLst>
-                                    <p:set>
-                                      <p:cBhvr>
-                                        <p:cTn id="30" dur="1" fill="hold">
-                                          <p:stCondLst>
-                                            <p:cond delay="0"/>
-                                          </p:stCondLst>
-                                        </p:cTn>
-                                        <p:tgtEl>
-                                          <p:spTgt spid="6"/>
-                                        </p:tgtEl>
-                                        <p:attrNameLst>
-                                          <p:attrName>style.visibility</p:attrName>
-                                        </p:attrNameLst>
-                                      </p:cBhvr>
-                                      <p:to>
-                                        <p:strVal val="visible"/>
-                                      </p:to>
-                                    </p:set>
-                                    <p:anim calcmode="lin" valueType="num">
-                                      <p:cBhvr additive="base">
-                                        <p:cTn id="31" dur="500" fill="hold"/>
-                                        <p:tgtEl>
-                                          <p:spTgt spid="6"/>
-                                        </p:tgtEl>
-                                        <p:attrNameLst>
-                                          <p:attrName>ppt_x</p:attrName>
-                                        </p:attrNameLst>
-                                      </p:cBhvr>
-                                      <p:tavLst>
-                                        <p:tav tm="0">
-                                          <p:val>
-                                            <p:strVal val="#ppt_x"/>
-                                          </p:val>
-                                        </p:tav>
-                                        <p:tav tm="100000">
-                                          <p:val>
-                                            <p:strVal val="#ppt_x"/>
-                                          </p:val>
-                                        </p:tav>
-                                      </p:tavLst>
-                                    </p:anim>
-                                    <p:anim calcmode="lin" valueType="num">
-                                      <p:cBhvr additive="base">
-                                        <p:cTn id="32" dur="500" fill="hold"/>
-                                        <p:tgtEl>
-                                          <p:spTgt spid="6"/>
-                                        </p:tgtEl>
-                                        <p:attrNameLst>
-                                          <p:attrName>ppt_y</p:attrName>
-                                        </p:attrNameLst>
-                                      </p:cBhvr>
-                                      <p:tavLst>
-                                        <p:tav tm="0">
-                                          <p:val>
-                                            <p:strVal val="1+#ppt_h/2"/>
-                                          </p:val>
-                                        </p:tav>
-                                        <p:tav tm="100000">
-                                          <p:val>
-                                            <p:strVal val="#ppt_y"/>
-                                          </p:val>
-                                        </p:tav>
-                                      </p:tavLst>
-                                    </p:anim>
-                                  </p:childTnLst>
-                                </p:cTn>
-                              </p:par>
-                            </p:childTnLst>
-                          </p:cTn>
-                        </p:par>
-                      </p:childTnLst>
-                    </p:cTn>
-                  </p:par>
-                  <p:par>
-                    <p:cTn id="33" fill="hold">
-                      <p:stCondLst>
-                        <p:cond delay="indefinite"/>
-                      </p:stCondLst>
-                      <p:childTnLst>
-                        <p:par>
-                          <p:cTn id="34" fill="hold">
-                            <p:stCondLst>
-                              <p:cond delay="0"/>
-                            </p:stCondLst>
-                            <p:childTnLst>
-                              <p:par>
-                                <p:cTn id="35" presetID="2" presetClass="entr" presetSubtype="4" fill="hold" grpId="0" nodeType="clickEffect">
-                                  <p:stCondLst>
-                                    <p:cond delay="0"/>
-                                  </p:stCondLst>
-                                  <p:childTnLst>
-                                    <p:set>
-                                      <p:cBhvr>
-                                        <p:cTn id="36" dur="1" fill="hold">
-                                          <p:stCondLst>
-                                            <p:cond delay="0"/>
-                                          </p:stCondLst>
-                                        </p:cTn>
-                                        <p:tgtEl>
-                                          <p:spTgt spid="12"/>
-                                        </p:tgtEl>
-                                        <p:attrNameLst>
-                                          <p:attrName>style.visibility</p:attrName>
-                                        </p:attrNameLst>
-                                      </p:cBhvr>
-                                      <p:to>
-                                        <p:strVal val="visible"/>
-                                      </p:to>
-                                    </p:set>
-                                    <p:anim calcmode="lin" valueType="num">
-                                      <p:cBhvr additive="base">
-                                        <p:cTn id="37" dur="500" fill="hold"/>
-                                        <p:tgtEl>
-                                          <p:spTgt spid="12"/>
-                                        </p:tgtEl>
-                                        <p:attrNameLst>
-                                          <p:attrName>ppt_x</p:attrName>
-                                        </p:attrNameLst>
-                                      </p:cBhvr>
-                                      <p:tavLst>
-                                        <p:tav tm="0">
-                                          <p:val>
-                                            <p:strVal val="#ppt_x"/>
-                                          </p:val>
-                                        </p:tav>
-                                        <p:tav tm="100000">
-                                          <p:val>
-                                            <p:strVal val="#ppt_x"/>
-                                          </p:val>
-                                        </p:tav>
-                                      </p:tavLst>
-                                    </p:anim>
-                                    <p:anim calcmode="lin" valueType="num">
-                                      <p:cBhvr additive="base">
-                                        <p:cTn id="38" dur="500" fill="hold"/>
-                                        <p:tgtEl>
-                                          <p:spTgt spid="12"/>
-                                        </p:tgtEl>
-                                        <p:attrNameLst>
-                                          <p:attrName>ppt_y</p:attrName>
-                                        </p:attrNameLst>
-                                      </p:cBhvr>
-                                      <p:tavLst>
-                                        <p:tav tm="0">
-                                          <p:val>
-                                            <p:strVal val="1+#ppt_h/2"/>
-                                          </p:val>
-                                        </p:tav>
-                                        <p:tav tm="100000">
-                                          <p:val>
-                                            <p:strVal val="#ppt_y"/>
-                                          </p:val>
-                                        </p:tav>
-                                      </p:tavLst>
-                                    </p:anim>
-                                  </p:childTnLst>
-                                </p:cTn>
-                              </p:par>
-                            </p:childTnLst>
-                          </p:cTn>
-                        </p:par>
-                      </p:childTnLst>
-                    </p:cTn>
-                  </p:par>
-                  <p:par>
-                    <p:cTn id="39" fill="hold">
-                      <p:stCondLst>
-                        <p:cond delay="indefinite"/>
-                      </p:stCondLst>
-                      <p:childTnLst>
-                        <p:par>
-                          <p:cTn id="40" fill="hold">
-                            <p:stCondLst>
-                              <p:cond delay="0"/>
-                            </p:stCondLst>
-                            <p:childTnLst>
-                              <p:par>
-                                <p:cTn id="41" presetID="2" presetClass="entr" presetSubtype="4" fill="hold" nodeType="clickEffect">
-                                  <p:stCondLst>
-                                    <p:cond delay="0"/>
-                                  </p:stCondLst>
-                                  <p:childTnLst>
-                                    <p:set>
-                                      <p:cBhvr>
-                                        <p:cTn id="42" dur="1" fill="hold">
-                                          <p:stCondLst>
-                                            <p:cond delay="0"/>
-                                          </p:stCondLst>
-                                        </p:cTn>
-                                        <p:tgtEl>
-                                          <p:spTgt spid="7"/>
-                                        </p:tgtEl>
-                                        <p:attrNameLst>
-                                          <p:attrName>style.visibility</p:attrName>
-                                        </p:attrNameLst>
-                                      </p:cBhvr>
-                                      <p:to>
-                                        <p:strVal val="visible"/>
-                                      </p:to>
-                                    </p:set>
-                                    <p:anim calcmode="lin" valueType="num">
-                                      <p:cBhvr additive="base">
-                                        <p:cTn id="43" dur="500" fill="hold"/>
-                                        <p:tgtEl>
-                                          <p:spTgt spid="7"/>
-                                        </p:tgtEl>
-                                        <p:attrNameLst>
-                                          <p:attrName>ppt_x</p:attrName>
-                                        </p:attrNameLst>
-                                      </p:cBhvr>
-                                      <p:tavLst>
-                                        <p:tav tm="0">
-                                          <p:val>
-                                            <p:strVal val="#ppt_x"/>
-                                          </p:val>
-                                        </p:tav>
-                                        <p:tav tm="100000">
-                                          <p:val>
-                                            <p:strVal val="#ppt_x"/>
-                                          </p:val>
-                                        </p:tav>
-                                      </p:tavLst>
-                                    </p:anim>
-                                    <p:anim calcmode="lin" valueType="num">
-                                      <p:cBhvr additive="base">
-                                        <p:cTn id="44" dur="500" fill="hold"/>
-                                        <p:tgtEl>
-                                          <p:spTgt spid="7"/>
-                                        </p:tgtEl>
-                                        <p:attrNameLst>
-                                          <p:attrName>ppt_y</p:attrName>
-                                        </p:attrNameLst>
-                                      </p:cBhvr>
-                                      <p:tavLst>
-                                        <p:tav tm="0">
-                                          <p:val>
-                                            <p:strVal val="1+#ppt_h/2"/>
-                                          </p:val>
-                                        </p:tav>
-                                        <p:tav tm="100000">
-                                          <p:val>
-                                            <p:strVal val="#ppt_y"/>
-                                          </p:val>
-                                        </p:tav>
-                                      </p:tavLst>
-                                    </p:anim>
-                                  </p:childTnLst>
-                                </p:cTn>
-                              </p:par>
-                            </p:childTnLst>
-                          </p:cTn>
-                        </p:par>
-                      </p:childTnLst>
-                    </p:cTn>
-                  </p:par>
-                </p:childTnLst>
-              </p:cTn>
-              <p:prevCondLst>
-                <p:cond evt="onPrev" delay="0">
-                  <p:tgtEl>
-                    <p:sldTgt/>
-                  </p:tgtEl>
-                </p:cond>
-              </p:prevCondLst>
-              <p:nextCondLst>
-                <p:cond evt="onNext" delay="0">
-                  <p:tgtEl>
-                    <p:sldTgt/>
-                  </p:tgtEl>
-                </p:cond>
-              </p:nextCondLst>
-            </p:seq>
-          </p:childTnLst>
-        </p:cTn>
-      </p:par>
-    </p:tnLst>
-    <p:bldLst>
-      <p:bldP spid="10" grpId="0"/>
-      <p:bldP spid="11" grpId="0"/>
-      <p:bldP spid="12" grpId="0"/>
-    </p:bldLst>
-  </p:timing>
-</p:sld>
-</file>
-
-<file path=ppt/slides/slide14.xml><?xml version="1.0" encoding="utf-8"?>
 <p:sld xmlns:a="http://schemas.openxmlformats.org/drawingml/2006/main" xmlns:r="http://schemas.openxmlformats.org/officeDocument/2006/relationships" xmlns:p="http://schemas.openxmlformats.org/presentationml/2006/main">
   <p:cSld>
     <p:spTree>
@@ -11108,11 +9233,7 @@
             </a:r>
             <a:r>
               <a:rPr lang="en-US" dirty="0" smtClean="0"/>
-              <a:t> system </a:t>
-            </a:r>
-            <a:r>
-              <a:rPr lang="en-US" dirty="0" smtClean="0"/>
-              <a:t>in a cloud VM for this project</a:t>
+              <a:t> system in a cloud VM for this project</a:t>
             </a:r>
           </a:p>
           <a:p>
@@ -12082,11 +10203,7 @@
           <a:p>
             <a:r>
               <a:rPr lang="en-US" dirty="0" smtClean="0"/>
-              <a:t>The Physical </a:t>
-            </a:r>
-            <a:r>
-              <a:rPr lang="en-US" dirty="0" smtClean="0"/>
-              <a:t>Architecture – Initial Concept</a:t>
+              <a:t>The Physical Architecture – Initial Concept</a:t>
             </a:r>
             <a:endParaRPr lang="en-US" dirty="0"/>
           </a:p>
@@ -14112,11 +12229,7 @@
           <a:p>
             <a:r>
               <a:rPr lang="en-US" dirty="0" smtClean="0"/>
-              <a:t>The Physical </a:t>
-            </a:r>
-            <a:r>
-              <a:rPr lang="en-US" dirty="0" smtClean="0"/>
-              <a:t>Architecture Now</a:t>
+              <a:t>The Physical Architecture Now</a:t>
             </a:r>
             <a:endParaRPr lang="en-US" dirty="0"/>
           </a:p>
@@ -14976,6 +13089,1019 @@
           <a:chExt cx="0" cy="0"/>
         </a:xfrm>
       </p:grpSpPr>
+      <p:cxnSp>
+        <p:nvCxnSpPr>
+          <p:cNvPr id="10" name="Straight Connector 9"/>
+          <p:cNvCxnSpPr/>
+          <p:nvPr/>
+        </p:nvCxnSpPr>
+        <p:spPr>
+          <a:xfrm>
+            <a:off x="2330245" y="3011532"/>
+            <a:ext cx="3629961" cy="262610"/>
+          </a:xfrm>
+          <a:prstGeom prst="line">
+            <a:avLst/>
+          </a:prstGeom>
+          <a:ln>
+            <a:solidFill>
+              <a:schemeClr val="accent4"/>
+            </a:solidFill>
+          </a:ln>
+        </p:spPr>
+        <p:style>
+          <a:lnRef idx="1">
+            <a:schemeClr val="accent1"/>
+          </a:lnRef>
+          <a:fillRef idx="0">
+            <a:schemeClr val="accent1"/>
+          </a:fillRef>
+          <a:effectRef idx="0">
+            <a:schemeClr val="accent1"/>
+          </a:effectRef>
+          <a:fontRef idx="minor">
+            <a:schemeClr val="tx1"/>
+          </a:fontRef>
+        </p:style>
+      </p:cxnSp>
+      <p:cxnSp>
+        <p:nvCxnSpPr>
+          <p:cNvPr id="13" name="Straight Connector 12"/>
+          <p:cNvCxnSpPr/>
+          <p:nvPr/>
+        </p:nvCxnSpPr>
+        <p:spPr>
+          <a:xfrm>
+            <a:off x="6558116" y="3362632"/>
+            <a:ext cx="2831690" cy="1336852"/>
+          </a:xfrm>
+          <a:prstGeom prst="line">
+            <a:avLst/>
+          </a:prstGeom>
+          <a:ln>
+            <a:solidFill>
+              <a:schemeClr val="accent4"/>
+            </a:solidFill>
+          </a:ln>
+        </p:spPr>
+        <p:style>
+          <a:lnRef idx="1">
+            <a:schemeClr val="accent1"/>
+          </a:lnRef>
+          <a:fillRef idx="0">
+            <a:schemeClr val="accent1"/>
+          </a:fillRef>
+          <a:effectRef idx="0">
+            <a:schemeClr val="accent1"/>
+          </a:effectRef>
+          <a:fontRef idx="minor">
+            <a:schemeClr val="tx1"/>
+          </a:fontRef>
+        </p:style>
+      </p:cxnSp>
+      <p:cxnSp>
+        <p:nvCxnSpPr>
+          <p:cNvPr id="16" name="Straight Connector 15"/>
+          <p:cNvCxnSpPr/>
+          <p:nvPr/>
+        </p:nvCxnSpPr>
+        <p:spPr>
+          <a:xfrm flipV="1">
+            <a:off x="6449961" y="3138843"/>
+            <a:ext cx="2782529" cy="189090"/>
+          </a:xfrm>
+          <a:prstGeom prst="line">
+            <a:avLst/>
+          </a:prstGeom>
+          <a:ln>
+            <a:solidFill>
+              <a:schemeClr val="accent4"/>
+            </a:solidFill>
+          </a:ln>
+        </p:spPr>
+        <p:style>
+          <a:lnRef idx="1">
+            <a:schemeClr val="accent1"/>
+          </a:lnRef>
+          <a:fillRef idx="0">
+            <a:schemeClr val="accent1"/>
+          </a:fillRef>
+          <a:effectRef idx="0">
+            <a:schemeClr val="accent1"/>
+          </a:effectRef>
+          <a:fontRef idx="minor">
+            <a:schemeClr val="tx1"/>
+          </a:fontRef>
+        </p:style>
+      </p:cxnSp>
+      <p:cxnSp>
+        <p:nvCxnSpPr>
+          <p:cNvPr id="21" name="Straight Connector 20"/>
+          <p:cNvCxnSpPr/>
+          <p:nvPr/>
+        </p:nvCxnSpPr>
+        <p:spPr>
+          <a:xfrm>
+            <a:off x="2482645" y="3163932"/>
+            <a:ext cx="2229614" cy="1189922"/>
+          </a:xfrm>
+          <a:prstGeom prst="line">
+            <a:avLst/>
+          </a:prstGeom>
+          <a:ln>
+            <a:solidFill>
+              <a:schemeClr val="accent4"/>
+            </a:solidFill>
+          </a:ln>
+        </p:spPr>
+        <p:style>
+          <a:lnRef idx="1">
+            <a:schemeClr val="accent1"/>
+          </a:lnRef>
+          <a:fillRef idx="0">
+            <a:schemeClr val="accent1"/>
+          </a:fillRef>
+          <a:effectRef idx="0">
+            <a:schemeClr val="accent1"/>
+          </a:effectRef>
+          <a:fontRef idx="minor">
+            <a:schemeClr val="tx1"/>
+          </a:fontRef>
+        </p:style>
+      </p:cxnSp>
+      <p:cxnSp>
+        <p:nvCxnSpPr>
+          <p:cNvPr id="23" name="Straight Connector 22"/>
+          <p:cNvCxnSpPr/>
+          <p:nvPr/>
+        </p:nvCxnSpPr>
+        <p:spPr>
+          <a:xfrm flipV="1">
+            <a:off x="7000568" y="4707948"/>
+            <a:ext cx="2231922" cy="553861"/>
+          </a:xfrm>
+          <a:prstGeom prst="line">
+            <a:avLst/>
+          </a:prstGeom>
+          <a:ln>
+            <a:solidFill>
+              <a:schemeClr val="accent4"/>
+            </a:solidFill>
+          </a:ln>
+        </p:spPr>
+        <p:style>
+          <a:lnRef idx="1">
+            <a:schemeClr val="accent1"/>
+          </a:lnRef>
+          <a:fillRef idx="0">
+            <a:schemeClr val="accent1"/>
+          </a:fillRef>
+          <a:effectRef idx="0">
+            <a:schemeClr val="accent1"/>
+          </a:effectRef>
+          <a:fontRef idx="minor">
+            <a:schemeClr val="tx1"/>
+          </a:fontRef>
+        </p:style>
+      </p:cxnSp>
+      <p:sp>
+        <p:nvSpPr>
+          <p:cNvPr id="2" name="Title 1"/>
+          <p:cNvSpPr>
+            <a:spLocks noGrp="1"/>
+          </p:cNvSpPr>
+          <p:nvPr>
+            <p:ph type="title"/>
+          </p:nvPr>
+        </p:nvSpPr>
+        <p:spPr/>
+        <p:txBody>
+          <a:bodyPr/>
+          <a:lstStyle/>
+          <a:p>
+            <a:r>
+              <a:rPr lang="en-US" dirty="0" smtClean="0"/>
+              <a:t>Primary Use Case: Check-in at VA Facility</a:t>
+            </a:r>
+            <a:endParaRPr lang="en-US" dirty="0"/>
+          </a:p>
+        </p:txBody>
+      </p:sp>
+      <p:sp>
+        <p:nvSpPr>
+          <p:cNvPr id="3" name="Rectangle 2"/>
+          <p:cNvSpPr/>
+          <p:nvPr/>
+        </p:nvSpPr>
+        <p:spPr>
+          <a:xfrm>
+            <a:off x="3303639" y="2231923"/>
+            <a:ext cx="4798142" cy="4149212"/>
+          </a:xfrm>
+          <a:prstGeom prst="rect">
+            <a:avLst/>
+          </a:prstGeom>
+          <a:noFill/>
+          <a:ln w="19050">
+            <a:solidFill>
+              <a:srgbClr val="FFC000"/>
+            </a:solidFill>
+          </a:ln>
+        </p:spPr>
+        <p:style>
+          <a:lnRef idx="2">
+            <a:schemeClr val="accent1">
+              <a:shade val="50000"/>
+            </a:schemeClr>
+          </a:lnRef>
+          <a:fillRef idx="1">
+            <a:schemeClr val="accent1"/>
+          </a:fillRef>
+          <a:effectRef idx="0">
+            <a:schemeClr val="accent1"/>
+          </a:effectRef>
+          <a:fontRef idx="minor">
+            <a:schemeClr val="lt1"/>
+          </a:fontRef>
+        </p:style>
+        <p:txBody>
+          <a:bodyPr rtlCol="0" anchor="ctr"/>
+          <a:lstStyle/>
+          <a:p>
+            <a:pPr algn="ctr"/>
+            <a:endParaRPr lang="en-US"/>
+          </a:p>
+        </p:txBody>
+      </p:sp>
+      <p:pic>
+        <p:nvPicPr>
+          <p:cNvPr id="4" name="Picture 3"/>
+          <p:cNvPicPr>
+            <a:picLocks noChangeAspect="1"/>
+          </p:cNvPicPr>
+          <p:nvPr/>
+        </p:nvPicPr>
+        <p:blipFill>
+          <a:blip r:embed="rId2"/>
+          <a:stretch>
+            <a:fillRect/>
+          </a:stretch>
+        </p:blipFill>
+        <p:spPr>
+          <a:xfrm>
+            <a:off x="1968861" y="2533235"/>
+            <a:ext cx="703086" cy="1382173"/>
+          </a:xfrm>
+          <a:prstGeom prst="rect">
+            <a:avLst/>
+          </a:prstGeom>
+        </p:spPr>
+      </p:pic>
+      <p:pic>
+        <p:nvPicPr>
+          <p:cNvPr id="5" name="Picture 4"/>
+          <p:cNvPicPr>
+            <a:picLocks noChangeAspect="1"/>
+          </p:cNvPicPr>
+          <p:nvPr/>
+        </p:nvPicPr>
+        <p:blipFill>
+          <a:blip r:embed="rId3"/>
+          <a:stretch>
+            <a:fillRect/>
+          </a:stretch>
+        </p:blipFill>
+        <p:spPr>
+          <a:xfrm>
+            <a:off x="5568562" y="3011532"/>
+            <a:ext cx="1549984" cy="632802"/>
+          </a:xfrm>
+          <a:prstGeom prst="rect">
+            <a:avLst/>
+          </a:prstGeom>
+        </p:spPr>
+      </p:pic>
+      <p:pic>
+        <p:nvPicPr>
+          <p:cNvPr id="6" name="Picture 5"/>
+          <p:cNvPicPr>
+            <a:picLocks noChangeAspect="1"/>
+          </p:cNvPicPr>
+          <p:nvPr/>
+        </p:nvPicPr>
+        <p:blipFill>
+          <a:blip r:embed="rId4"/>
+          <a:stretch>
+            <a:fillRect/>
+          </a:stretch>
+        </p:blipFill>
+        <p:spPr>
+          <a:xfrm>
+            <a:off x="5960206" y="4845492"/>
+            <a:ext cx="1549986" cy="832635"/>
+          </a:xfrm>
+          <a:prstGeom prst="rect">
+            <a:avLst/>
+          </a:prstGeom>
+        </p:spPr>
+      </p:pic>
+      <p:pic>
+        <p:nvPicPr>
+          <p:cNvPr id="7" name="Picture 6"/>
+          <p:cNvPicPr>
+            <a:picLocks noChangeAspect="1"/>
+          </p:cNvPicPr>
+          <p:nvPr/>
+        </p:nvPicPr>
+        <p:blipFill>
+          <a:blip r:embed="rId5"/>
+          <a:stretch>
+            <a:fillRect/>
+          </a:stretch>
+        </p:blipFill>
+        <p:spPr>
+          <a:xfrm>
+            <a:off x="3937267" y="4066682"/>
+            <a:ext cx="1549984" cy="632802"/>
+          </a:xfrm>
+          <a:prstGeom prst="rect">
+            <a:avLst/>
+          </a:prstGeom>
+        </p:spPr>
+      </p:pic>
+      <p:pic>
+        <p:nvPicPr>
+          <p:cNvPr id="8" name="Picture 7"/>
+          <p:cNvPicPr>
+            <a:picLocks noChangeAspect="1"/>
+          </p:cNvPicPr>
+          <p:nvPr/>
+        </p:nvPicPr>
+        <p:blipFill>
+          <a:blip r:embed="rId6"/>
+          <a:stretch>
+            <a:fillRect/>
+          </a:stretch>
+        </p:blipFill>
+        <p:spPr>
+          <a:xfrm>
+            <a:off x="8864539" y="4291494"/>
+            <a:ext cx="1070608" cy="815981"/>
+          </a:xfrm>
+          <a:prstGeom prst="rect">
+            <a:avLst/>
+          </a:prstGeom>
+        </p:spPr>
+      </p:pic>
+      <p:pic>
+        <p:nvPicPr>
+          <p:cNvPr id="9" name="Picture 8"/>
+          <p:cNvPicPr>
+            <a:picLocks noChangeAspect="1"/>
+          </p:cNvPicPr>
+          <p:nvPr/>
+        </p:nvPicPr>
+        <p:blipFill>
+          <a:blip r:embed="rId7"/>
+          <a:stretch>
+            <a:fillRect/>
+          </a:stretch>
+        </p:blipFill>
+        <p:spPr>
+          <a:xfrm>
+            <a:off x="8848165" y="2533235"/>
+            <a:ext cx="1070608" cy="1115729"/>
+          </a:xfrm>
+          <a:prstGeom prst="rect">
+            <a:avLst/>
+          </a:prstGeom>
+        </p:spPr>
+      </p:pic>
+      <p:cxnSp>
+        <p:nvCxnSpPr>
+          <p:cNvPr id="26" name="Straight Connector 25"/>
+          <p:cNvCxnSpPr/>
+          <p:nvPr/>
+        </p:nvCxnSpPr>
+        <p:spPr>
+          <a:xfrm flipH="1">
+            <a:off x="5133464" y="3570322"/>
+            <a:ext cx="1051460" cy="526890"/>
+          </a:xfrm>
+          <a:prstGeom prst="line">
+            <a:avLst/>
+          </a:prstGeom>
+          <a:ln w="12700">
+            <a:solidFill>
+              <a:schemeClr val="accent4"/>
+            </a:solidFill>
+            <a:prstDash val="dash"/>
+            <a:tailEnd type="arrow" w="lg" len="lg"/>
+          </a:ln>
+        </p:spPr>
+        <p:style>
+          <a:lnRef idx="1">
+            <a:schemeClr val="accent1"/>
+          </a:lnRef>
+          <a:fillRef idx="0">
+            <a:schemeClr val="accent1"/>
+          </a:fillRef>
+          <a:effectRef idx="0">
+            <a:schemeClr val="accent1"/>
+          </a:effectRef>
+          <a:fontRef idx="minor">
+            <a:schemeClr val="tx1"/>
+          </a:fontRef>
+        </p:style>
+      </p:cxnSp>
+      <p:sp>
+        <p:nvSpPr>
+          <p:cNvPr id="27" name="TextBox 26"/>
+          <p:cNvSpPr txBox="1"/>
+          <p:nvPr/>
+        </p:nvSpPr>
+        <p:spPr>
+          <a:xfrm>
+            <a:off x="5092974" y="3709821"/>
+            <a:ext cx="983226" cy="246221"/>
+          </a:xfrm>
+          <a:prstGeom prst="rect">
+            <a:avLst/>
+          </a:prstGeom>
+          <a:noFill/>
+        </p:spPr>
+        <p:txBody>
+          <a:bodyPr wrap="square" rtlCol="0">
+            <a:spAutoFit/>
+          </a:bodyPr>
+          <a:lstStyle/>
+          <a:p>
+            <a:pPr algn="ctr"/>
+            <a:r>
+              <a:rPr lang="en-US" sz="1000" dirty="0" smtClean="0">
+                <a:solidFill>
+                  <a:srgbClr val="FFFF00"/>
+                </a:solidFill>
+              </a:rPr>
+              <a:t>&lt;&lt;include&gt;&gt;</a:t>
+            </a:r>
+            <a:endParaRPr lang="en-US" sz="1000" dirty="0">
+              <a:solidFill>
+                <a:srgbClr val="FFFF00"/>
+              </a:solidFill>
+            </a:endParaRPr>
+          </a:p>
+        </p:txBody>
+      </p:sp>
+      <p:cxnSp>
+        <p:nvCxnSpPr>
+          <p:cNvPr id="29" name="Straight Connector 28"/>
+          <p:cNvCxnSpPr>
+            <a:endCxn id="6" idx="0"/>
+          </p:cNvCxnSpPr>
+          <p:nvPr/>
+        </p:nvCxnSpPr>
+        <p:spPr>
+          <a:xfrm>
+            <a:off x="6558116" y="3592003"/>
+            <a:ext cx="177083" cy="1253489"/>
+          </a:xfrm>
+          <a:prstGeom prst="line">
+            <a:avLst/>
+          </a:prstGeom>
+          <a:ln w="12700">
+            <a:solidFill>
+              <a:schemeClr val="accent4"/>
+            </a:solidFill>
+            <a:prstDash val="dash"/>
+            <a:tailEnd type="arrow" w="lg" len="lg"/>
+          </a:ln>
+        </p:spPr>
+        <p:style>
+          <a:lnRef idx="1">
+            <a:schemeClr val="accent1"/>
+          </a:lnRef>
+          <a:fillRef idx="0">
+            <a:schemeClr val="accent1"/>
+          </a:fillRef>
+          <a:effectRef idx="0">
+            <a:schemeClr val="accent1"/>
+          </a:effectRef>
+          <a:fontRef idx="minor">
+            <a:schemeClr val="tx1"/>
+          </a:fontRef>
+        </p:style>
+      </p:cxnSp>
+      <p:sp>
+        <p:nvSpPr>
+          <p:cNvPr id="30" name="TextBox 29"/>
+          <p:cNvSpPr txBox="1"/>
+          <p:nvPr/>
+        </p:nvSpPr>
+        <p:spPr>
+          <a:xfrm>
+            <a:off x="6114197" y="4045816"/>
+            <a:ext cx="983226" cy="246221"/>
+          </a:xfrm>
+          <a:prstGeom prst="rect">
+            <a:avLst/>
+          </a:prstGeom>
+          <a:noFill/>
+        </p:spPr>
+        <p:txBody>
+          <a:bodyPr wrap="square" rtlCol="0">
+            <a:spAutoFit/>
+          </a:bodyPr>
+          <a:lstStyle/>
+          <a:p>
+            <a:pPr algn="ctr"/>
+            <a:r>
+              <a:rPr lang="en-US" sz="1000" dirty="0" smtClean="0">
+                <a:solidFill>
+                  <a:srgbClr val="FFFF00"/>
+                </a:solidFill>
+              </a:rPr>
+              <a:t>&lt;&lt;include&gt;&gt;</a:t>
+            </a:r>
+            <a:endParaRPr lang="en-US" sz="1000" dirty="0">
+              <a:solidFill>
+                <a:srgbClr val="FFFF00"/>
+              </a:solidFill>
+            </a:endParaRPr>
+          </a:p>
+        </p:txBody>
+      </p:sp>
+    </p:spTree>
+    <p:extLst>
+      <p:ext uri="{BB962C8B-B14F-4D97-AF65-F5344CB8AC3E}">
+        <p14:creationId xmlns:p14="http://schemas.microsoft.com/office/powerpoint/2010/main" val="2473677034"/>
+      </p:ext>
+    </p:extLst>
+  </p:cSld>
+  <p:clrMapOvr>
+    <a:masterClrMapping/>
+  </p:clrMapOvr>
+  <p:transition spd="slow">
+    <p:wipe dir="r"/>
+  </p:transition>
+  <p:timing>
+    <p:tnLst>
+      <p:par>
+        <p:cTn id="1" dur="indefinite" restart="never" nodeType="tmRoot">
+          <p:childTnLst>
+            <p:seq concurrent="1" nextAc="seek">
+              <p:cTn id="2" dur="indefinite" nodeType="mainSeq">
+                <p:childTnLst>
+                  <p:par>
+                    <p:cTn id="3" fill="hold">
+                      <p:stCondLst>
+                        <p:cond delay="indefinite"/>
+                      </p:stCondLst>
+                      <p:childTnLst>
+                        <p:par>
+                          <p:cTn id="4" fill="hold">
+                            <p:stCondLst>
+                              <p:cond delay="0"/>
+                            </p:stCondLst>
+                            <p:childTnLst>
+                              <p:par>
+                                <p:cTn id="5" presetID="22" presetClass="entr" presetSubtype="8" fill="hold" nodeType="clickEffect">
+                                  <p:stCondLst>
+                                    <p:cond delay="0"/>
+                                  </p:stCondLst>
+                                  <p:childTnLst>
+                                    <p:set>
+                                      <p:cBhvr>
+                                        <p:cTn id="6" dur="1" fill="hold">
+                                          <p:stCondLst>
+                                            <p:cond delay="0"/>
+                                          </p:stCondLst>
+                                        </p:cTn>
+                                        <p:tgtEl>
+                                          <p:spTgt spid="21"/>
+                                        </p:tgtEl>
+                                        <p:attrNameLst>
+                                          <p:attrName>style.visibility</p:attrName>
+                                        </p:attrNameLst>
+                                      </p:cBhvr>
+                                      <p:to>
+                                        <p:strVal val="visible"/>
+                                      </p:to>
+                                    </p:set>
+                                    <p:animEffect transition="in" filter="wipe(left)">
+                                      <p:cBhvr>
+                                        <p:cTn id="7" dur="500"/>
+                                        <p:tgtEl>
+                                          <p:spTgt spid="21"/>
+                                        </p:tgtEl>
+                                      </p:cBhvr>
+                                    </p:animEffect>
+                                  </p:childTnLst>
+                                </p:cTn>
+                              </p:par>
+                              <p:par>
+                                <p:cTn id="8" presetID="22" presetClass="entr" presetSubtype="8" fill="hold" nodeType="withEffect">
+                                  <p:stCondLst>
+                                    <p:cond delay="0"/>
+                                  </p:stCondLst>
+                                  <p:childTnLst>
+                                    <p:set>
+                                      <p:cBhvr>
+                                        <p:cTn id="9" dur="1" fill="hold">
+                                          <p:stCondLst>
+                                            <p:cond delay="0"/>
+                                          </p:stCondLst>
+                                        </p:cTn>
+                                        <p:tgtEl>
+                                          <p:spTgt spid="7"/>
+                                        </p:tgtEl>
+                                        <p:attrNameLst>
+                                          <p:attrName>style.visibility</p:attrName>
+                                        </p:attrNameLst>
+                                      </p:cBhvr>
+                                      <p:to>
+                                        <p:strVal val="visible"/>
+                                      </p:to>
+                                    </p:set>
+                                    <p:animEffect transition="in" filter="wipe(left)">
+                                      <p:cBhvr>
+                                        <p:cTn id="10" dur="500"/>
+                                        <p:tgtEl>
+                                          <p:spTgt spid="7"/>
+                                        </p:tgtEl>
+                                      </p:cBhvr>
+                                    </p:animEffect>
+                                  </p:childTnLst>
+                                </p:cTn>
+                              </p:par>
+                              <p:par>
+                                <p:cTn id="11" presetID="22" presetClass="entr" presetSubtype="8" fill="hold" grpId="0" nodeType="withEffect">
+                                  <p:stCondLst>
+                                    <p:cond delay="0"/>
+                                  </p:stCondLst>
+                                  <p:childTnLst>
+                                    <p:set>
+                                      <p:cBhvr>
+                                        <p:cTn id="12" dur="1" fill="hold">
+                                          <p:stCondLst>
+                                            <p:cond delay="0"/>
+                                          </p:stCondLst>
+                                        </p:cTn>
+                                        <p:tgtEl>
+                                          <p:spTgt spid="27"/>
+                                        </p:tgtEl>
+                                        <p:attrNameLst>
+                                          <p:attrName>style.visibility</p:attrName>
+                                        </p:attrNameLst>
+                                      </p:cBhvr>
+                                      <p:to>
+                                        <p:strVal val="visible"/>
+                                      </p:to>
+                                    </p:set>
+                                    <p:animEffect transition="in" filter="wipe(left)">
+                                      <p:cBhvr>
+                                        <p:cTn id="13" dur="500"/>
+                                        <p:tgtEl>
+                                          <p:spTgt spid="27"/>
+                                        </p:tgtEl>
+                                      </p:cBhvr>
+                                    </p:animEffect>
+                                  </p:childTnLst>
+                                </p:cTn>
+                              </p:par>
+                              <p:par>
+                                <p:cTn id="14" presetID="22" presetClass="entr" presetSubtype="8" fill="hold" nodeType="withEffect">
+                                  <p:stCondLst>
+                                    <p:cond delay="0"/>
+                                  </p:stCondLst>
+                                  <p:childTnLst>
+                                    <p:set>
+                                      <p:cBhvr>
+                                        <p:cTn id="15" dur="1" fill="hold">
+                                          <p:stCondLst>
+                                            <p:cond delay="0"/>
+                                          </p:stCondLst>
+                                        </p:cTn>
+                                        <p:tgtEl>
+                                          <p:spTgt spid="26"/>
+                                        </p:tgtEl>
+                                        <p:attrNameLst>
+                                          <p:attrName>style.visibility</p:attrName>
+                                        </p:attrNameLst>
+                                      </p:cBhvr>
+                                      <p:to>
+                                        <p:strVal val="visible"/>
+                                      </p:to>
+                                    </p:set>
+                                    <p:animEffect transition="in" filter="wipe(left)">
+                                      <p:cBhvr>
+                                        <p:cTn id="16" dur="500"/>
+                                        <p:tgtEl>
+                                          <p:spTgt spid="26"/>
+                                        </p:tgtEl>
+                                      </p:cBhvr>
+                                    </p:animEffect>
+                                  </p:childTnLst>
+                                </p:cTn>
+                              </p:par>
+                            </p:childTnLst>
+                          </p:cTn>
+                        </p:par>
+                      </p:childTnLst>
+                    </p:cTn>
+                  </p:par>
+                  <p:par>
+                    <p:cTn id="17" fill="hold">
+                      <p:stCondLst>
+                        <p:cond delay="indefinite"/>
+                      </p:stCondLst>
+                      <p:childTnLst>
+                        <p:par>
+                          <p:cTn id="18" fill="hold">
+                            <p:stCondLst>
+                              <p:cond delay="0"/>
+                            </p:stCondLst>
+                            <p:childTnLst>
+                              <p:par>
+                                <p:cTn id="19" presetID="22" presetClass="entr" presetSubtype="8" fill="hold" nodeType="clickEffect">
+                                  <p:stCondLst>
+                                    <p:cond delay="0"/>
+                                  </p:stCondLst>
+                                  <p:childTnLst>
+                                    <p:set>
+                                      <p:cBhvr>
+                                        <p:cTn id="20" dur="1" fill="hold">
+                                          <p:stCondLst>
+                                            <p:cond delay="0"/>
+                                          </p:stCondLst>
+                                        </p:cTn>
+                                        <p:tgtEl>
+                                          <p:spTgt spid="29"/>
+                                        </p:tgtEl>
+                                        <p:attrNameLst>
+                                          <p:attrName>style.visibility</p:attrName>
+                                        </p:attrNameLst>
+                                      </p:cBhvr>
+                                      <p:to>
+                                        <p:strVal val="visible"/>
+                                      </p:to>
+                                    </p:set>
+                                    <p:animEffect transition="in" filter="wipe(left)">
+                                      <p:cBhvr>
+                                        <p:cTn id="21" dur="500"/>
+                                        <p:tgtEl>
+                                          <p:spTgt spid="29"/>
+                                        </p:tgtEl>
+                                      </p:cBhvr>
+                                    </p:animEffect>
+                                  </p:childTnLst>
+                                </p:cTn>
+                              </p:par>
+                              <p:par>
+                                <p:cTn id="22" presetID="22" presetClass="entr" presetSubtype="8" fill="hold" grpId="0" nodeType="withEffect">
+                                  <p:stCondLst>
+                                    <p:cond delay="0"/>
+                                  </p:stCondLst>
+                                  <p:childTnLst>
+                                    <p:set>
+                                      <p:cBhvr>
+                                        <p:cTn id="23" dur="1" fill="hold">
+                                          <p:stCondLst>
+                                            <p:cond delay="0"/>
+                                          </p:stCondLst>
+                                        </p:cTn>
+                                        <p:tgtEl>
+                                          <p:spTgt spid="30"/>
+                                        </p:tgtEl>
+                                        <p:attrNameLst>
+                                          <p:attrName>style.visibility</p:attrName>
+                                        </p:attrNameLst>
+                                      </p:cBhvr>
+                                      <p:to>
+                                        <p:strVal val="visible"/>
+                                      </p:to>
+                                    </p:set>
+                                    <p:animEffect transition="in" filter="wipe(left)">
+                                      <p:cBhvr>
+                                        <p:cTn id="24" dur="500"/>
+                                        <p:tgtEl>
+                                          <p:spTgt spid="30"/>
+                                        </p:tgtEl>
+                                      </p:cBhvr>
+                                    </p:animEffect>
+                                  </p:childTnLst>
+                                </p:cTn>
+                              </p:par>
+                              <p:par>
+                                <p:cTn id="25" presetID="22" presetClass="entr" presetSubtype="8" fill="hold" nodeType="withEffect">
+                                  <p:stCondLst>
+                                    <p:cond delay="0"/>
+                                  </p:stCondLst>
+                                  <p:childTnLst>
+                                    <p:set>
+                                      <p:cBhvr>
+                                        <p:cTn id="26" dur="1" fill="hold">
+                                          <p:stCondLst>
+                                            <p:cond delay="0"/>
+                                          </p:stCondLst>
+                                        </p:cTn>
+                                        <p:tgtEl>
+                                          <p:spTgt spid="6"/>
+                                        </p:tgtEl>
+                                        <p:attrNameLst>
+                                          <p:attrName>style.visibility</p:attrName>
+                                        </p:attrNameLst>
+                                      </p:cBhvr>
+                                      <p:to>
+                                        <p:strVal val="visible"/>
+                                      </p:to>
+                                    </p:set>
+                                    <p:animEffect transition="in" filter="wipe(left)">
+                                      <p:cBhvr>
+                                        <p:cTn id="27" dur="500"/>
+                                        <p:tgtEl>
+                                          <p:spTgt spid="6"/>
+                                        </p:tgtEl>
+                                      </p:cBhvr>
+                                    </p:animEffect>
+                                  </p:childTnLst>
+                                </p:cTn>
+                              </p:par>
+                              <p:par>
+                                <p:cTn id="28" presetID="22" presetClass="entr" presetSubtype="8" fill="hold" nodeType="withEffect">
+                                  <p:stCondLst>
+                                    <p:cond delay="0"/>
+                                  </p:stCondLst>
+                                  <p:childTnLst>
+                                    <p:set>
+                                      <p:cBhvr>
+                                        <p:cTn id="29" dur="1" fill="hold">
+                                          <p:stCondLst>
+                                            <p:cond delay="0"/>
+                                          </p:stCondLst>
+                                        </p:cTn>
+                                        <p:tgtEl>
+                                          <p:spTgt spid="23"/>
+                                        </p:tgtEl>
+                                        <p:attrNameLst>
+                                          <p:attrName>style.visibility</p:attrName>
+                                        </p:attrNameLst>
+                                      </p:cBhvr>
+                                      <p:to>
+                                        <p:strVal val="visible"/>
+                                      </p:to>
+                                    </p:set>
+                                    <p:animEffect transition="in" filter="wipe(left)">
+                                      <p:cBhvr>
+                                        <p:cTn id="30" dur="500"/>
+                                        <p:tgtEl>
+                                          <p:spTgt spid="23"/>
+                                        </p:tgtEl>
+                                      </p:cBhvr>
+                                    </p:animEffect>
+                                  </p:childTnLst>
+                                </p:cTn>
+                              </p:par>
+                            </p:childTnLst>
+                          </p:cTn>
+                        </p:par>
+                      </p:childTnLst>
+                    </p:cTn>
+                  </p:par>
+                  <p:par>
+                    <p:cTn id="31" fill="hold">
+                      <p:stCondLst>
+                        <p:cond delay="indefinite"/>
+                      </p:stCondLst>
+                      <p:childTnLst>
+                        <p:par>
+                          <p:cTn id="32" fill="hold">
+                            <p:stCondLst>
+                              <p:cond delay="0"/>
+                            </p:stCondLst>
+                            <p:childTnLst>
+                              <p:par>
+                                <p:cTn id="33" presetID="22" presetClass="entr" presetSubtype="8" fill="hold" nodeType="clickEffect">
+                                  <p:stCondLst>
+                                    <p:cond delay="0"/>
+                                  </p:stCondLst>
+                                  <p:childTnLst>
+                                    <p:set>
+                                      <p:cBhvr>
+                                        <p:cTn id="34" dur="1" fill="hold">
+                                          <p:stCondLst>
+                                            <p:cond delay="0"/>
+                                          </p:stCondLst>
+                                        </p:cTn>
+                                        <p:tgtEl>
+                                          <p:spTgt spid="16"/>
+                                        </p:tgtEl>
+                                        <p:attrNameLst>
+                                          <p:attrName>style.visibility</p:attrName>
+                                        </p:attrNameLst>
+                                      </p:cBhvr>
+                                      <p:to>
+                                        <p:strVal val="visible"/>
+                                      </p:to>
+                                    </p:set>
+                                    <p:animEffect transition="in" filter="wipe(left)">
+                                      <p:cBhvr>
+                                        <p:cTn id="35" dur="500"/>
+                                        <p:tgtEl>
+                                          <p:spTgt spid="16"/>
+                                        </p:tgtEl>
+                                      </p:cBhvr>
+                                    </p:animEffect>
+                                  </p:childTnLst>
+                                </p:cTn>
+                              </p:par>
+                              <p:par>
+                                <p:cTn id="36" presetID="22" presetClass="entr" presetSubtype="8" fill="hold" nodeType="withEffect">
+                                  <p:stCondLst>
+                                    <p:cond delay="0"/>
+                                  </p:stCondLst>
+                                  <p:childTnLst>
+                                    <p:set>
+                                      <p:cBhvr>
+                                        <p:cTn id="37" dur="1" fill="hold">
+                                          <p:stCondLst>
+                                            <p:cond delay="0"/>
+                                          </p:stCondLst>
+                                        </p:cTn>
+                                        <p:tgtEl>
+                                          <p:spTgt spid="9"/>
+                                        </p:tgtEl>
+                                        <p:attrNameLst>
+                                          <p:attrName>style.visibility</p:attrName>
+                                        </p:attrNameLst>
+                                      </p:cBhvr>
+                                      <p:to>
+                                        <p:strVal val="visible"/>
+                                      </p:to>
+                                    </p:set>
+                                    <p:animEffect transition="in" filter="wipe(left)">
+                                      <p:cBhvr>
+                                        <p:cTn id="38" dur="500"/>
+                                        <p:tgtEl>
+                                          <p:spTgt spid="9"/>
+                                        </p:tgtEl>
+                                      </p:cBhvr>
+                                    </p:animEffect>
+                                  </p:childTnLst>
+                                </p:cTn>
+                              </p:par>
+                            </p:childTnLst>
+                          </p:cTn>
+                        </p:par>
+                      </p:childTnLst>
+                    </p:cTn>
+                  </p:par>
+                </p:childTnLst>
+              </p:cTn>
+              <p:prevCondLst>
+                <p:cond evt="onPrev" delay="0">
+                  <p:tgtEl>
+                    <p:sldTgt/>
+                  </p:tgtEl>
+                </p:cond>
+              </p:prevCondLst>
+              <p:nextCondLst>
+                <p:cond evt="onNext" delay="0">
+                  <p:tgtEl>
+                    <p:sldTgt/>
+                  </p:tgtEl>
+                </p:cond>
+              </p:nextCondLst>
+            </p:seq>
+          </p:childTnLst>
+        </p:cTn>
+      </p:par>
+    </p:tnLst>
+    <p:bldLst>
+      <p:bldP spid="27" grpId="0"/>
+      <p:bldP spid="30" grpId="0"/>
+    </p:bldLst>
+  </p:timing>
+</p:sld>
+</file>
+
+<file path=ppt/slides/slide8.xml><?xml version="1.0" encoding="utf-8"?>
+<p:sld xmlns:a="http://schemas.openxmlformats.org/drawingml/2006/main" xmlns:r="http://schemas.openxmlformats.org/officeDocument/2006/relationships" xmlns:p="http://schemas.openxmlformats.org/presentationml/2006/main">
+  <p:cSld>
+    <p:spTree>
+      <p:nvGrpSpPr>
+        <p:cNvPr id="1" name=""/>
+        <p:cNvGrpSpPr/>
+        <p:nvPr/>
+      </p:nvGrpSpPr>
+      <p:grpSpPr>
+        <a:xfrm>
+          <a:off x="0" y="0"/>
+          <a:ext cx="0" cy="0"/>
+          <a:chOff x="0" y="0"/>
+          <a:chExt cx="0" cy="0"/>
+        </a:xfrm>
+      </p:grpSpPr>
       <p:sp>
         <p:nvSpPr>
           <p:cNvPr id="2" name="Title 1"/>
@@ -15094,7 +14220,7 @@
 </p:sld>
 </file>
 
-<file path=ppt/slides/slide8.xml><?xml version="1.0" encoding="utf-8"?>
+<file path=ppt/slides/slide9.xml><?xml version="1.0" encoding="utf-8"?>
 <p:sld xmlns:a="http://schemas.openxmlformats.org/drawingml/2006/main" xmlns:r="http://schemas.openxmlformats.org/officeDocument/2006/relationships" xmlns:p="http://schemas.openxmlformats.org/presentationml/2006/main">
   <p:cSld>
     <p:spTree>
@@ -17156,135 +16282,6 @@
 </p:sld>
 </file>
 
-<file path=ppt/slides/slide9.xml><?xml version="1.0" encoding="utf-8"?>
-<p:sld xmlns:a="http://schemas.openxmlformats.org/drawingml/2006/main" xmlns:r="http://schemas.openxmlformats.org/officeDocument/2006/relationships" xmlns:p="http://schemas.openxmlformats.org/presentationml/2006/main">
-  <p:cSld>
-    <p:spTree>
-      <p:nvGrpSpPr>
-        <p:cNvPr id="1" name=""/>
-        <p:cNvGrpSpPr/>
-        <p:nvPr/>
-      </p:nvGrpSpPr>
-      <p:grpSpPr>
-        <a:xfrm>
-          <a:off x="0" y="0"/>
-          <a:ext cx="0" cy="0"/>
-          <a:chOff x="0" y="0"/>
-          <a:chExt cx="0" cy="0"/>
-        </a:xfrm>
-      </p:grpSpPr>
-      <p:sp>
-        <p:nvSpPr>
-          <p:cNvPr id="2" name="Title 1"/>
-          <p:cNvSpPr>
-            <a:spLocks noGrp="1"/>
-          </p:cNvSpPr>
-          <p:nvPr>
-            <p:ph type="title"/>
-          </p:nvPr>
-        </p:nvSpPr>
-        <p:spPr/>
-        <p:txBody>
-          <a:bodyPr/>
-          <a:lstStyle/>
-          <a:p>
-            <a:r>
-              <a:rPr lang="en-US" smtClean="0"/>
-              <a:t>RESTful Nirvana?</a:t>
-            </a:r>
-            <a:endParaRPr lang="en-US"/>
-          </a:p>
-        </p:txBody>
-      </p:sp>
-      <p:sp>
-        <p:nvSpPr>
-          <p:cNvPr id="3" name="Content Placeholder 2"/>
-          <p:cNvSpPr>
-            <a:spLocks noGrp="1"/>
-          </p:cNvSpPr>
-          <p:nvPr>
-            <p:ph idx="1"/>
-          </p:nvPr>
-        </p:nvSpPr>
-        <p:spPr>
-          <a:xfrm>
-            <a:off x="680321" y="2336873"/>
-            <a:ext cx="10086002" cy="3599316"/>
-          </a:xfrm>
-        </p:spPr>
-        <p:txBody>
-          <a:bodyPr/>
-          <a:lstStyle/>
-          <a:p>
-            <a:r>
-              <a:rPr lang="en-US" dirty="0" smtClean="0"/>
-              <a:t>All services use plain-old JSON to represent the state being transferred</a:t>
-            </a:r>
-          </a:p>
-          <a:p>
-            <a:r>
-              <a:rPr lang="en-US" dirty="0" smtClean="0"/>
-              <a:t>Everything is fully stateless</a:t>
-            </a:r>
-          </a:p>
-          <a:p>
-            <a:pPr lvl="1"/>
-            <a:r>
-              <a:rPr lang="en-US" dirty="0" smtClean="0"/>
-              <a:t>Only server-side state is authentication session – described by an opaque token</a:t>
-            </a:r>
-          </a:p>
-          <a:p>
-            <a:r>
-              <a:rPr lang="en-US" dirty="0" smtClean="0"/>
-              <a:t>State described as resources and collections of resources</a:t>
-            </a:r>
-          </a:p>
-          <a:p>
-            <a:pPr lvl="1"/>
-            <a:r>
-              <a:rPr lang="en-US" dirty="0" smtClean="0"/>
-              <a:t>Out of band information in HTTP headers</a:t>
-            </a:r>
-          </a:p>
-          <a:p>
-            <a:pPr lvl="1"/>
-            <a:r>
-              <a:rPr lang="en-US" dirty="0" smtClean="0"/>
-              <a:t>Queries to narrow state selection passed in query-strings</a:t>
-            </a:r>
-          </a:p>
-          <a:p>
-            <a:r>
-              <a:rPr lang="en-US" dirty="0" smtClean="0"/>
-              <a:t>Access by standard HTTP verbs: GET, POST, PUT, DELETE</a:t>
-            </a:r>
-          </a:p>
-          <a:p>
-            <a:r>
-              <a:rPr lang="en-US" dirty="0" smtClean="0"/>
-              <a:t>Use of hypermedia links where appropriate</a:t>
-            </a:r>
-            <a:endParaRPr lang="en-US" dirty="0"/>
-          </a:p>
-        </p:txBody>
-      </p:sp>
-    </p:spTree>
-    <p:extLst>
-      <p:ext uri="{BB962C8B-B14F-4D97-AF65-F5344CB8AC3E}">
-        <p14:creationId xmlns:p14="http://schemas.microsoft.com/office/powerpoint/2010/main" val="1040371199"/>
-      </p:ext>
-    </p:extLst>
-  </p:cSld>
-  <p:clrMapOvr>
-    <a:masterClrMapping/>
-  </p:clrMapOvr>
-  <p:transition spd="slow">
-    <p:wipe dir="r"/>
-  </p:transition>
-</p:sld>
-</file>
-
 <file path=ppt/theme/theme1.xml><?xml version="1.0" encoding="utf-8"?>
 <a:theme xmlns:a="http://schemas.openxmlformats.org/drawingml/2006/main" name="Berlin">
   <a:themeElements>

</xml_diff>